<commit_message>
Corrected typos and added MobaXterm slide
</commit_message>
<xml_diff>
--- a/working_practices/Parallel_Processing_Large_Data.pptx
+++ b/working_practices/Parallel_Processing_Large_Data.pptx
@@ -5,7 +5,7 @@
     <p:sldMasterId id="2147483666" r:id="rId1"/>
   </p:sldMasterIdLst>
   <p:notesMasterIdLst>
-    <p:notesMasterId r:id="rId34"/>
+    <p:notesMasterId r:id="rId35"/>
   </p:notesMasterIdLst>
   <p:sldIdLst>
     <p:sldId id="256" r:id="rId2"/>
@@ -22,61 +22,62 @@
     <p:sldId id="267" r:id="rId13"/>
     <p:sldId id="291" r:id="rId14"/>
     <p:sldId id="290" r:id="rId15"/>
-    <p:sldId id="269" r:id="rId16"/>
-    <p:sldId id="270" r:id="rId17"/>
-    <p:sldId id="271" r:id="rId18"/>
-    <p:sldId id="273" r:id="rId19"/>
-    <p:sldId id="274" r:id="rId20"/>
-    <p:sldId id="276" r:id="rId21"/>
-    <p:sldId id="277" r:id="rId22"/>
-    <p:sldId id="278" r:id="rId23"/>
-    <p:sldId id="279" r:id="rId24"/>
-    <p:sldId id="280" r:id="rId25"/>
-    <p:sldId id="281" r:id="rId26"/>
-    <p:sldId id="275" r:id="rId27"/>
-    <p:sldId id="282" r:id="rId28"/>
-    <p:sldId id="283" r:id="rId29"/>
-    <p:sldId id="285" r:id="rId30"/>
-    <p:sldId id="286" r:id="rId31"/>
-    <p:sldId id="287" r:id="rId32"/>
-    <p:sldId id="288" r:id="rId33"/>
+    <p:sldId id="292" r:id="rId16"/>
+    <p:sldId id="269" r:id="rId17"/>
+    <p:sldId id="270" r:id="rId18"/>
+    <p:sldId id="271" r:id="rId19"/>
+    <p:sldId id="273" r:id="rId20"/>
+    <p:sldId id="274" r:id="rId21"/>
+    <p:sldId id="276" r:id="rId22"/>
+    <p:sldId id="277" r:id="rId23"/>
+    <p:sldId id="278" r:id="rId24"/>
+    <p:sldId id="279" r:id="rId25"/>
+    <p:sldId id="280" r:id="rId26"/>
+    <p:sldId id="281" r:id="rId27"/>
+    <p:sldId id="275" r:id="rId28"/>
+    <p:sldId id="282" r:id="rId29"/>
+    <p:sldId id="283" r:id="rId30"/>
+    <p:sldId id="285" r:id="rId31"/>
+    <p:sldId id="286" r:id="rId32"/>
+    <p:sldId id="287" r:id="rId33"/>
+    <p:sldId id="288" r:id="rId34"/>
   </p:sldIdLst>
   <p:sldSz cx="9144000" cy="6858000" type="screen4x3"/>
   <p:notesSz cx="6858000" cy="9144000"/>
   <p:embeddedFontLst>
     <p:embeddedFont>
-      <p:font typeface="Merriweather Sans" panose="020B0604020202020204" charset="0"/>
-      <p:regular r:id="rId35"/>
-      <p:bold r:id="rId36"/>
-      <p:italic r:id="rId37"/>
+      <p:font typeface="ＭＳ Ｐゴシック" panose="020B0600070205080204" pitchFamily="34" charset="-128"/>
+      <p:regular r:id="rId36"/>
+    </p:embeddedFont>
+    <p:embeddedFont>
+      <p:font typeface="Nunito" panose="020B0604020202020204" charset="0"/>
+      <p:bold r:id="rId37"/>
       <p:boldItalic r:id="rId38"/>
     </p:embeddedFont>
     <p:embeddedFont>
-      <p:font typeface="Arimo" panose="020B0604020202020204" charset="0"/>
+      <p:font typeface="Calibri" panose="020F0502020204030204" pitchFamily="34" charset="0"/>
       <p:regular r:id="rId39"/>
       <p:bold r:id="rId40"/>
       <p:italic r:id="rId41"/>
       <p:boldItalic r:id="rId42"/>
     </p:embeddedFont>
     <p:embeddedFont>
-      <p:font typeface="Nunito" panose="020B0604020202020204" charset="0"/>
-      <p:bold r:id="rId43"/>
-      <p:boldItalic r:id="rId44"/>
-    </p:embeddedFont>
-    <p:embeddedFont>
-      <p:font typeface="Calibri" panose="020F0502020204030204" pitchFamily="34" charset="0"/>
-      <p:regular r:id="rId45"/>
-      <p:bold r:id="rId46"/>
-      <p:italic r:id="rId47"/>
-      <p:boldItalic r:id="rId48"/>
+      <p:font typeface="Merriweather Sans" panose="020B0604020202020204" charset="0"/>
+      <p:regular r:id="rId43"/>
+      <p:bold r:id="rId44"/>
+      <p:italic r:id="rId45"/>
+      <p:boldItalic r:id="rId46"/>
     </p:embeddedFont>
     <p:embeddedFont>
       <p:font typeface="Arial Rounded MT Bold" panose="020F0704030504030204" pitchFamily="34" charset="0"/>
-      <p:regular r:id="rId49"/>
+      <p:regular r:id="rId47"/>
     </p:embeddedFont>
     <p:embeddedFont>
-      <p:font typeface="ＭＳ Ｐゴシック" panose="020B0600070205080204" pitchFamily="34" charset="-128"/>
-      <p:regular r:id="rId50"/>
+      <p:font typeface="Arimo" panose="020B0604020202020204" charset="0"/>
+      <p:regular r:id="rId48"/>
+      <p:bold r:id="rId49"/>
+      <p:italic r:id="rId50"/>
+      <p:boldItalic r:id="rId51"/>
     </p:embeddedFont>
   </p:embeddedFontLst>
   <p:defaultTextStyle>
@@ -1949,7 +1950,7 @@
             </a:pPr>
             <a:fld id="{00000000-1234-1234-1234-123412341234}" type="slidenum">
               <a:rPr lang="en-GB"/>
-              <a:t>18</a:t>
+              <a:t>19</a:t>
             </a:fld>
             <a:endParaRPr/>
           </a:p>
@@ -2499,7 +2500,7 @@
                 <a:cs typeface="Arial"/>
                 <a:sym typeface="Arial"/>
               </a:rPr>
-              <a:t>20</a:t>
+              <a:t>21</a:t>
             </a:fld>
             <a:endParaRPr sz="1200">
               <a:solidFill>
@@ -3301,7 +3302,7 @@
                 <a:cs typeface="Arial"/>
                 <a:sym typeface="Arial"/>
               </a:rPr>
-              <a:t>22</a:t>
+              <a:t>23</a:t>
             </a:fld>
             <a:endParaRPr sz="1200">
               <a:solidFill>
@@ -3545,7 +3546,7 @@
                 <a:cs typeface="Arial"/>
                 <a:sym typeface="Arial"/>
               </a:rPr>
-              <a:t>23</a:t>
+              <a:t>24</a:t>
             </a:fld>
             <a:endParaRPr sz="1200">
               <a:solidFill>
@@ -3848,7 +3849,7 @@
                 <a:cs typeface="Arial"/>
                 <a:sym typeface="Arial"/>
               </a:rPr>
-              <a:t>24</a:t>
+              <a:t>25</a:t>
             </a:fld>
             <a:endParaRPr sz="1200">
               <a:solidFill>
@@ -4151,7 +4152,7 @@
                 <a:cs typeface="Arial"/>
                 <a:sym typeface="Arial"/>
               </a:rPr>
-              <a:t>25</a:t>
+              <a:t>26</a:t>
             </a:fld>
             <a:endParaRPr sz="1200">
               <a:solidFill>
@@ -4691,7 +4692,7 @@
                 <a:cs typeface="Arial"/>
                 <a:sym typeface="Arial"/>
               </a:rPr>
-              <a:t>27</a:t>
+              <a:t>28</a:t>
             </a:fld>
             <a:endParaRPr sz="1200">
               <a:solidFill>
@@ -4994,7 +4995,7 @@
                 <a:cs typeface="Arial"/>
                 <a:sym typeface="Arial"/>
               </a:rPr>
-              <a:t>28</a:t>
+              <a:t>29</a:t>
             </a:fld>
             <a:endParaRPr sz="1200">
               <a:solidFill>
@@ -5178,7 +5179,7 @@
                 <a:cs typeface="Arial"/>
                 <a:sym typeface="Arial"/>
               </a:rPr>
-              <a:t>29</a:t>
+              <a:t>30</a:t>
             </a:fld>
             <a:endParaRPr sz="1200">
               <a:solidFill>
@@ -5388,7 +5389,7 @@
                 <a:cs typeface="Calibri"/>
                 <a:sym typeface="Calibri"/>
               </a:rPr>
-              <a:t>30</a:t>
+              <a:t>31</a:t>
             </a:fld>
             <a:endParaRPr sz="1200">
               <a:solidFill>
@@ -5572,7 +5573,7 @@
                 <a:cs typeface="Arial"/>
                 <a:sym typeface="Arial"/>
               </a:rPr>
-              <a:t>31</a:t>
+              <a:t>32</a:t>
             </a:fld>
             <a:endParaRPr sz="1200">
               <a:solidFill>
@@ -6021,7 +6022,7 @@
                 <a:cs typeface="Arial"/>
                 <a:sym typeface="Arial"/>
               </a:rPr>
-              <a:t>32</a:t>
+              <a:t>33</a:t>
             </a:fld>
             <a:endParaRPr sz="1200">
               <a:solidFill>
@@ -15101,7 +15102,11 @@
           <a:p>
             <a:r>
               <a:rPr lang="en-GB" sz="2800" dirty="0" smtClean="0"/>
-              <a:t>Apply for an account:</a:t>
+              <a:t>Applying </a:t>
+            </a:r>
+            <a:r>
+              <a:rPr lang="en-GB" sz="2800" dirty="0" smtClean="0"/>
+              <a:t>for an account:</a:t>
             </a:r>
           </a:p>
           <a:p>
@@ -15164,8 +15169,87 @@
                   <a:schemeClr val="tx1"/>
                 </a:solidFill>
               </a:rPr>
-              <a:t>Apply for login access</a:t>
-            </a:r>
+              <a:t>Apply for </a:t>
+            </a:r>
+            <a:r>
+              <a:rPr lang="en-GB" sz="2800" dirty="0">
+                <a:solidFill>
+                  <a:schemeClr val="tx1"/>
+                </a:solidFill>
+              </a:rPr>
+              <a:t>JASMIN account: </a:t>
+            </a:r>
+            <a:r>
+              <a:rPr lang="en-GB" b="1" dirty="0">
+                <a:solidFill>
+                  <a:srgbClr val="0070C0"/>
+                </a:solidFill>
+                <a:hlinkClick r:id="rId3"/>
+              </a:rPr>
+              <a:t>https://</a:t>
+            </a:r>
+            <a:r>
+              <a:rPr lang="en-GB" b="1" dirty="0" smtClean="0">
+                <a:solidFill>
+                  <a:srgbClr val="0070C0"/>
+                </a:solidFill>
+                <a:hlinkClick r:id="rId3"/>
+              </a:rPr>
+              <a:t>accounts.jasmin.ac.uk/</a:t>
+            </a:r>
+            <a:r>
+              <a:rPr lang="en-GB" dirty="0" smtClean="0">
+                <a:solidFill>
+                  <a:schemeClr val="tx1"/>
+                </a:solidFill>
+              </a:rPr>
+              <a:t> </a:t>
+            </a:r>
+            <a:r>
+              <a:rPr lang="en-GB" sz="2800" dirty="0" smtClean="0">
+                <a:solidFill>
+                  <a:schemeClr val="tx1"/>
+                </a:solidFill>
+              </a:rPr>
+              <a:t>and upload your </a:t>
+            </a:r>
+            <a:r>
+              <a:rPr lang="en-GB" sz="2800" b="1" dirty="0" smtClean="0">
+                <a:solidFill>
+                  <a:schemeClr val="tx1"/>
+                </a:solidFill>
+              </a:rPr>
+              <a:t>PUBLIC</a:t>
+            </a:r>
+            <a:r>
+              <a:rPr lang="en-GB" sz="2800" dirty="0" smtClean="0">
+                <a:solidFill>
+                  <a:schemeClr val="tx1"/>
+                </a:solidFill>
+              </a:rPr>
+              <a:t> </a:t>
+            </a:r>
+            <a:r>
+              <a:rPr lang="en-GB" sz="2800" dirty="0" err="1" smtClean="0">
+                <a:solidFill>
+                  <a:schemeClr val="tx1"/>
+                </a:solidFill>
+              </a:rPr>
+              <a:t>ssh</a:t>
+            </a:r>
+            <a:r>
+              <a:rPr lang="en-GB" sz="2800" dirty="0" smtClean="0">
+                <a:solidFill>
+                  <a:schemeClr val="tx1"/>
+                </a:solidFill>
+              </a:rPr>
+              <a:t> key</a:t>
+            </a:r>
+            <a:endParaRPr lang="en-GB" sz="2800" dirty="0" smtClean="0">
+              <a:solidFill>
+                <a:srgbClr val="0070C0"/>
+              </a:solidFill>
+            </a:endParaRPr>
           </a:p>
           <a:p>
             <a:pPr>
@@ -15178,7 +15262,39 @@
                   <a:schemeClr val="tx1"/>
                 </a:solidFill>
               </a:rPr>
-              <a:t>(Optionally) apply for CEDA account, access to project resources, fast data transfer service, etc.</a:t>
+              <a:t>Apply for JASMIN login access and (optionally</a:t>
+            </a:r>
+            <a:r>
+              <a:rPr lang="en-GB" sz="2800" dirty="0" smtClean="0">
+                <a:solidFill>
+                  <a:schemeClr val="tx1"/>
+                </a:solidFill>
+              </a:rPr>
+              <a:t>) </a:t>
+            </a:r>
+            <a:r>
+              <a:rPr lang="en-GB" sz="2800" dirty="0">
+                <a:solidFill>
+                  <a:schemeClr val="tx1"/>
+                </a:solidFill>
+              </a:rPr>
+              <a:t>a</a:t>
+            </a:r>
+            <a:r>
+              <a:rPr lang="en-GB" sz="2800" dirty="0" smtClean="0">
+                <a:solidFill>
+                  <a:schemeClr val="tx1"/>
+                </a:solidFill>
+              </a:rPr>
+              <a:t> </a:t>
+            </a:r>
+            <a:r>
+              <a:rPr lang="en-GB" sz="2800" dirty="0" smtClean="0">
+                <a:solidFill>
+                  <a:schemeClr val="tx1"/>
+                </a:solidFill>
+              </a:rPr>
+              <a:t>CEDA account, access to project resources, fast data transfer service, etc.</a:t>
             </a:r>
           </a:p>
           <a:p>
@@ -15192,7 +15308,15 @@
                   <a:schemeClr val="tx1"/>
                 </a:solidFill>
               </a:rPr>
-              <a:t>Login using your </a:t>
+              <a:t>Once access is granted, login </a:t>
+            </a:r>
+            <a:r>
+              <a:rPr lang="en-GB" sz="2800" dirty="0" smtClean="0">
+                <a:solidFill>
+                  <a:schemeClr val="tx1"/>
+                </a:solidFill>
+              </a:rPr>
+              <a:t>using your </a:t>
             </a:r>
             <a:r>
               <a:rPr lang="en-GB" sz="2800" dirty="0" err="1" smtClean="0">
@@ -15220,7 +15344,7 @@
                 <a:solidFill>
                   <a:srgbClr val="0070C0"/>
                 </a:solidFill>
-                <a:hlinkClick r:id="rId3"/>
+                <a:hlinkClick r:id="rId4"/>
               </a:rPr>
               <a:t>https://</a:t>
             </a:r>
@@ -15229,7 +15353,7 @@
                 <a:solidFill>
                   <a:srgbClr val="0070C0"/>
                 </a:solidFill>
-                <a:hlinkClick r:id="rId3"/>
+                <a:hlinkClick r:id="rId4"/>
               </a:rPr>
               <a:t>help.jasmin.ac.uk/article/187-login</a:t>
             </a:r>
@@ -15240,14 +15364,18 @@
             </a:endParaRPr>
           </a:p>
           <a:p>
-            <a:pPr>
-              <a:buFont typeface="Arial" panose="020B0604020202020204" pitchFamily="34" charset="0"/>
-              <a:buChar char="•"/>
-            </a:pPr>
+            <a:r>
+              <a:rPr lang="en-GB" sz="2800" dirty="0" err="1" smtClean="0">
+                <a:solidFill>
+                  <a:schemeClr val="tx1"/>
+                </a:solidFill>
+              </a:rPr>
+              <a:t>ssh</a:t>
+            </a:r>
             <a:r>
               <a:rPr lang="en-GB" sz="2800" dirty="0" smtClean="0">
                 <a:solidFill>
-                  <a:srgbClr val="0070C0"/>
+                  <a:schemeClr val="tx1"/>
                 </a:solidFill>
               </a:rPr>
               <a:t> </a:t>
@@ -15255,76 +15383,10 @@
             <a:r>
               <a:rPr lang="en-GB" sz="2800" dirty="0" smtClean="0">
                 <a:solidFill>
-                  <a:srgbClr val="FF0000"/>
-                </a:solidFill>
-              </a:rPr>
-              <a:t>From Windows use </a:t>
-            </a:r>
-            <a:r>
-              <a:rPr lang="en-GB" sz="2800" dirty="0" err="1" smtClean="0">
-                <a:solidFill>
-                  <a:srgbClr val="FF0000"/>
-                </a:solidFill>
-              </a:rPr>
-              <a:t>MobaXterm</a:t>
-            </a:r>
-            <a:r>
-              <a:rPr lang="en-GB" sz="2800" dirty="0" smtClean="0">
-                <a:solidFill>
-                  <a:srgbClr val="FF0000"/>
-                </a:solidFill>
-              </a:rPr>
-              <a:t> – free to download </a:t>
-            </a:r>
-            <a:r>
-              <a:rPr lang="en-GB" sz="2800" dirty="0" smtClean="0">
-                <a:solidFill>
                   <a:schemeClr val="tx1"/>
                 </a:solidFill>
               </a:rPr>
-              <a:t>(details on </a:t>
-            </a:r>
-            <a:r>
-              <a:rPr lang="en-GB" sz="2800" dirty="0" err="1" smtClean="0">
-                <a:solidFill>
-                  <a:schemeClr val="tx1"/>
-                </a:solidFill>
-              </a:rPr>
-              <a:t>jasmin</a:t>
-            </a:r>
-            <a:r>
-              <a:rPr lang="en-GB" sz="2800" dirty="0" smtClean="0">
-                <a:solidFill>
-                  <a:schemeClr val="tx1"/>
-                </a:solidFill>
-              </a:rPr>
-              <a:t> login help page)</a:t>
-            </a:r>
-          </a:p>
-          <a:p>
-            <a:r>
-              <a:rPr lang="en-GB" sz="2800" dirty="0" err="1">
-                <a:solidFill>
-                  <a:schemeClr val="tx1"/>
-                </a:solidFill>
-              </a:rPr>
-              <a:t>s</a:t>
-            </a:r>
-            <a:r>
-              <a:rPr lang="en-GB" sz="2800" dirty="0" err="1" smtClean="0">
-                <a:solidFill>
-                  <a:schemeClr val="tx1"/>
-                </a:solidFill>
-              </a:rPr>
-              <a:t>sh</a:t>
-            </a:r>
-            <a:r>
-              <a:rPr lang="en-GB" sz="2800" dirty="0" smtClean="0">
-                <a:solidFill>
-                  <a:schemeClr val="tx1"/>
-                </a:solidFill>
-              </a:rPr>
-              <a:t> to </a:t>
+              <a:t>to </a:t>
             </a:r>
             <a:r>
               <a:rPr lang="en-GB" sz="2800" dirty="0" err="1" smtClean="0">
@@ -15364,6 +15426,331 @@
 </file>
 
 <file path=ppt/slides/slide15.xml><?xml version="1.0" encoding="utf-8"?>
+<p:sld xmlns:a="http://schemas.openxmlformats.org/drawingml/2006/main" xmlns:r="http://schemas.openxmlformats.org/officeDocument/2006/relationships" xmlns:p="http://schemas.openxmlformats.org/presentationml/2006/main">
+  <p:cSld>
+    <p:spTree>
+      <p:nvGrpSpPr>
+        <p:cNvPr id="1" name=""/>
+        <p:cNvGrpSpPr/>
+        <p:nvPr/>
+      </p:nvGrpSpPr>
+      <p:grpSpPr>
+        <a:xfrm>
+          <a:off x="0" y="0"/>
+          <a:ext cx="0" cy="0"/>
+          <a:chOff x="0" y="0"/>
+          <a:chExt cx="0" cy="0"/>
+        </a:xfrm>
+      </p:grpSpPr>
+      <p:sp>
+        <p:nvSpPr>
+          <p:cNvPr id="2" name="Title 1"/>
+          <p:cNvSpPr>
+            <a:spLocks noGrp="1"/>
+          </p:cNvSpPr>
+          <p:nvPr>
+            <p:ph type="title"/>
+          </p:nvPr>
+        </p:nvSpPr>
+        <p:spPr>
+          <a:xfrm>
+            <a:off x="376518" y="154184"/>
+            <a:ext cx="8417858" cy="622565"/>
+          </a:xfrm>
+        </p:spPr>
+        <p:txBody>
+          <a:bodyPr/>
+          <a:lstStyle/>
+          <a:p>
+            <a:r>
+              <a:rPr lang="en-GB" b="1" dirty="0" smtClean="0">
+                <a:latin typeface="Arial Rounded MT Bold" panose="020F0704030504030204" pitchFamily="34" charset="0"/>
+              </a:rPr>
+              <a:t>Generating an </a:t>
+            </a:r>
+            <a:r>
+              <a:rPr lang="en-GB" b="1" dirty="0" err="1" smtClean="0">
+                <a:latin typeface="Arial Rounded MT Bold" panose="020F0704030504030204" pitchFamily="34" charset="0"/>
+              </a:rPr>
+              <a:t>ssh</a:t>
+            </a:r>
+            <a:r>
+              <a:rPr lang="en-GB" b="1" dirty="0" smtClean="0">
+                <a:latin typeface="Arial Rounded MT Bold" panose="020F0704030504030204" pitchFamily="34" charset="0"/>
+              </a:rPr>
+              <a:t> key pair</a:t>
+            </a:r>
+            <a:endParaRPr lang="en-GB" b="1" dirty="0">
+              <a:latin typeface="Arial Rounded MT Bold" panose="020F0704030504030204" pitchFamily="34" charset="0"/>
+            </a:endParaRPr>
+          </a:p>
+        </p:txBody>
+      </p:sp>
+      <p:sp>
+        <p:nvSpPr>
+          <p:cNvPr id="3" name="Text Placeholder 2"/>
+          <p:cNvSpPr>
+            <a:spLocks noGrp="1"/>
+          </p:cNvSpPr>
+          <p:nvPr>
+            <p:ph type="body" idx="1"/>
+          </p:nvPr>
+        </p:nvSpPr>
+        <p:spPr>
+          <a:xfrm>
+            <a:off x="376516" y="757085"/>
+            <a:ext cx="8417860" cy="5338915"/>
+          </a:xfrm>
+        </p:spPr>
+        <p:txBody>
+          <a:bodyPr/>
+          <a:lstStyle/>
+          <a:p>
+            <a:r>
+              <a:rPr lang="en-GB" sz="2800" dirty="0" smtClean="0">
+                <a:solidFill>
+                  <a:schemeClr val="tx1"/>
+                </a:solidFill>
+              </a:rPr>
+              <a:t>On Linux and Mac use a terminal window (bash)</a:t>
+            </a:r>
+          </a:p>
+          <a:p>
+            <a:r>
+              <a:rPr lang="en-GB" sz="2800" dirty="0" smtClean="0">
+                <a:solidFill>
+                  <a:schemeClr val="tx1"/>
+                </a:solidFill>
+              </a:rPr>
+              <a:t>On </a:t>
+            </a:r>
+            <a:r>
+              <a:rPr lang="en-GB" sz="2800" dirty="0">
+                <a:solidFill>
+                  <a:schemeClr val="tx1"/>
+                </a:solidFill>
+              </a:rPr>
+              <a:t>Windows use </a:t>
+            </a:r>
+            <a:r>
+              <a:rPr lang="en-GB" sz="2800" dirty="0" err="1">
+                <a:solidFill>
+                  <a:schemeClr val="tx1"/>
+                </a:solidFill>
+              </a:rPr>
+              <a:t>MobaXterm</a:t>
+            </a:r>
+            <a:r>
+              <a:rPr lang="en-GB" sz="2800" dirty="0">
+                <a:solidFill>
+                  <a:schemeClr val="tx1"/>
+                </a:solidFill>
+              </a:rPr>
+              <a:t> – free to </a:t>
+            </a:r>
+            <a:r>
+              <a:rPr lang="en-GB" sz="2800" dirty="0" smtClean="0">
+                <a:solidFill>
+                  <a:schemeClr val="tx1"/>
+                </a:solidFill>
+              </a:rPr>
+              <a:t>download</a:t>
+            </a:r>
+            <a:r>
+              <a:rPr lang="en-GB" b="1" dirty="0">
+                <a:solidFill>
+                  <a:srgbClr val="0070C0"/>
+                </a:solidFill>
+              </a:rPr>
+              <a:t> </a:t>
+            </a:r>
+            <a:r>
+              <a:rPr lang="en-GB" b="1" dirty="0" smtClean="0">
+                <a:solidFill>
+                  <a:srgbClr val="0070C0"/>
+                </a:solidFill>
+              </a:rPr>
+              <a:t>https</a:t>
+            </a:r>
+            <a:r>
+              <a:rPr lang="en-GB" b="1" dirty="0">
+                <a:solidFill>
+                  <a:srgbClr val="0070C0"/>
+                </a:solidFill>
+              </a:rPr>
+              <a:t>://help.jasmin.ac.uk/article/4832-mobaxterm-new</a:t>
+            </a:r>
+            <a:endParaRPr lang="en-GB" b="1" dirty="0" smtClean="0">
+              <a:solidFill>
+                <a:srgbClr val="0070C0"/>
+              </a:solidFill>
+            </a:endParaRPr>
+          </a:p>
+          <a:p>
+            <a:r>
+              <a:rPr lang="en-GB" sz="2800" dirty="0" smtClean="0">
+                <a:solidFill>
+                  <a:schemeClr val="tx1"/>
+                </a:solidFill>
+              </a:rPr>
+              <a:t>Use </a:t>
+            </a:r>
+            <a:r>
+              <a:rPr lang="en-GB" sz="2800" dirty="0" err="1" smtClean="0">
+                <a:solidFill>
+                  <a:srgbClr val="FF0000"/>
+                </a:solidFill>
+              </a:rPr>
+              <a:t>ssh-keygen</a:t>
+            </a:r>
+            <a:r>
+              <a:rPr lang="en-GB" sz="2800" dirty="0" smtClean="0">
+                <a:solidFill>
+                  <a:schemeClr val="tx1"/>
+                </a:solidFill>
+              </a:rPr>
+              <a:t> command to generate an RSA key pair – for JASMIN access you are </a:t>
+            </a:r>
+            <a:r>
+              <a:rPr lang="en-GB" sz="2800" b="1" dirty="0" smtClean="0">
+                <a:solidFill>
+                  <a:schemeClr val="tx1"/>
+                </a:solidFill>
+              </a:rPr>
+              <a:t>required</a:t>
+            </a:r>
+            <a:r>
+              <a:rPr lang="en-GB" sz="2800" dirty="0" smtClean="0">
+                <a:solidFill>
+                  <a:schemeClr val="tx1"/>
+                </a:solidFill>
+              </a:rPr>
+              <a:t> to set a passphrase</a:t>
+            </a:r>
+          </a:p>
+          <a:p>
+            <a:r>
+              <a:rPr lang="en-GB" sz="2800" dirty="0" smtClean="0">
+                <a:solidFill>
+                  <a:schemeClr val="tx1"/>
+                </a:solidFill>
+              </a:rPr>
+              <a:t>On Linux and Mac use </a:t>
+            </a:r>
+            <a:r>
+              <a:rPr lang="en-GB" sz="2800" dirty="0" err="1" smtClean="0">
+                <a:solidFill>
+                  <a:schemeClr val="tx1"/>
+                </a:solidFill>
+              </a:rPr>
+              <a:t>ssh</a:t>
+            </a:r>
+            <a:r>
+              <a:rPr lang="en-GB" sz="2800" dirty="0" smtClean="0">
+                <a:solidFill>
+                  <a:schemeClr val="tx1"/>
+                </a:solidFill>
+              </a:rPr>
+              <a:t>-agent and </a:t>
+            </a:r>
+            <a:r>
+              <a:rPr lang="en-GB" sz="2800" dirty="0" err="1" smtClean="0">
+                <a:solidFill>
+                  <a:schemeClr val="tx1"/>
+                </a:solidFill>
+              </a:rPr>
+              <a:t>ssh</a:t>
+            </a:r>
+            <a:r>
+              <a:rPr lang="en-GB" sz="2800" dirty="0" smtClean="0">
+                <a:solidFill>
+                  <a:schemeClr val="tx1"/>
+                </a:solidFill>
+              </a:rPr>
+              <a:t>-add to load a key for use with an </a:t>
+            </a:r>
+            <a:r>
+              <a:rPr lang="en-GB" sz="2800" dirty="0" err="1" smtClean="0">
+                <a:solidFill>
+                  <a:schemeClr val="tx1"/>
+                </a:solidFill>
+              </a:rPr>
+              <a:t>ssh</a:t>
+            </a:r>
+            <a:r>
+              <a:rPr lang="en-GB" sz="2800" dirty="0" smtClean="0">
+                <a:solidFill>
+                  <a:schemeClr val="tx1"/>
+                </a:solidFill>
+              </a:rPr>
+              <a:t> login</a:t>
+            </a:r>
+          </a:p>
+          <a:p>
+            <a:r>
+              <a:rPr lang="en-GB" sz="2800" dirty="0" smtClean="0">
+                <a:solidFill>
+                  <a:schemeClr val="tx1"/>
+                </a:solidFill>
+              </a:rPr>
+              <a:t>On Windows/</a:t>
+            </a:r>
+            <a:r>
+              <a:rPr lang="en-GB" sz="2800" dirty="0" err="1" smtClean="0">
+                <a:solidFill>
+                  <a:schemeClr val="tx1"/>
+                </a:solidFill>
+              </a:rPr>
+              <a:t>MobaXterm</a:t>
+            </a:r>
+            <a:r>
+              <a:rPr lang="en-GB" sz="2800" dirty="0" smtClean="0">
+                <a:solidFill>
+                  <a:schemeClr val="tx1"/>
+                </a:solidFill>
+              </a:rPr>
+              <a:t> – follow instructions in JASMIN help page</a:t>
+            </a:r>
+          </a:p>
+          <a:p>
+            <a:r>
+              <a:rPr lang="en-GB" sz="2800" dirty="0" smtClean="0">
+                <a:solidFill>
+                  <a:schemeClr val="tx1"/>
+                </a:solidFill>
+              </a:rPr>
+              <a:t>Once key is loaded, login to JASMIN with </a:t>
+            </a:r>
+            <a:r>
+              <a:rPr lang="en-GB" sz="2800" dirty="0" err="1" smtClean="0">
+                <a:solidFill>
+                  <a:schemeClr val="tx1"/>
+                </a:solidFill>
+              </a:rPr>
+              <a:t>ssh</a:t>
+            </a:r>
+            <a:endParaRPr lang="en-GB" sz="2800" dirty="0">
+              <a:solidFill>
+                <a:schemeClr val="tx1"/>
+              </a:solidFill>
+            </a:endParaRPr>
+          </a:p>
+        </p:txBody>
+      </p:sp>
+    </p:spTree>
+    <p:extLst>
+      <p:ext uri="{BB962C8B-B14F-4D97-AF65-F5344CB8AC3E}">
+        <p14:creationId xmlns:p14="http://schemas.microsoft.com/office/powerpoint/2010/main" val="2094350902"/>
+      </p:ext>
+    </p:extLst>
+  </p:cSld>
+  <p:clrMapOvr>
+    <a:masterClrMapping/>
+  </p:clrMapOvr>
+</p:sld>
+</file>
+
+<file path=ppt/slides/slide16.xml><?xml version="1.0" encoding="utf-8"?>
 <p:sld xmlns:a="http://schemas.openxmlformats.org/drawingml/2006/main" xmlns:r="http://schemas.openxmlformats.org/officeDocument/2006/relationships" xmlns:p="http://schemas.openxmlformats.org/presentationml/2006/main">
   <p:cSld>
     <p:spTree>
@@ -15699,7 +16086,7 @@
 </p:sld>
 </file>
 
-<file path=ppt/slides/slide16.xml><?xml version="1.0" encoding="utf-8"?>
+<file path=ppt/slides/slide17.xml><?xml version="1.0" encoding="utf-8"?>
 <p:sld xmlns:a="http://schemas.openxmlformats.org/drawingml/2006/main" xmlns:r="http://schemas.openxmlformats.org/officeDocument/2006/relationships" xmlns:p="http://schemas.openxmlformats.org/presentationml/2006/main">
   <p:cSld>
     <p:spTree>
@@ -16384,7 +16771,7 @@
 </p:sld>
 </file>
 
-<file path=ppt/slides/slide17.xml><?xml version="1.0" encoding="utf-8"?>
+<file path=ppt/slides/slide18.xml><?xml version="1.0" encoding="utf-8"?>
 <p:sld xmlns:a="http://schemas.openxmlformats.org/drawingml/2006/main" xmlns:r="http://schemas.openxmlformats.org/officeDocument/2006/relationships" xmlns:p="http://schemas.openxmlformats.org/presentationml/2006/main">
   <p:cSld>
     <p:spTree>
@@ -16925,7 +17312,7 @@
 </p:sld>
 </file>
 
-<file path=ppt/slides/slide18.xml><?xml version="1.0" encoding="utf-8"?>
+<file path=ppt/slides/slide19.xml><?xml version="1.0" encoding="utf-8"?>
 <p:sld xmlns:a="http://schemas.openxmlformats.org/drawingml/2006/main" xmlns:r="http://schemas.openxmlformats.org/officeDocument/2006/relationships" xmlns:p="http://schemas.openxmlformats.org/presentationml/2006/main">
   <p:cSld>
     <p:spTree>
@@ -17196,456 +17583,6 @@
           </p:txBody>
         </p:sp>
       </p:grpSp>
-    </p:spTree>
-  </p:cSld>
-  <p:clrMapOvr>
-    <a:masterClrMapping/>
-  </p:clrMapOvr>
-  <p:timing>
-    <p:tnLst>
-      <p:par>
-        <p:cTn id="1" dur="indefinite" restart="never" nodeType="tmRoot"/>
-      </p:par>
-    </p:tnLst>
-  </p:timing>
-</p:sld>
-</file>
-
-<file path=ppt/slides/slide19.xml><?xml version="1.0" encoding="utf-8"?>
-<p:sld xmlns:a="http://schemas.openxmlformats.org/drawingml/2006/main" xmlns:r="http://schemas.openxmlformats.org/officeDocument/2006/relationships" xmlns:p="http://schemas.openxmlformats.org/presentationml/2006/main">
-  <p:cSld>
-    <p:spTree>
-      <p:nvGrpSpPr>
-        <p:cNvPr id="1" name="Shape 277"/>
-        <p:cNvGrpSpPr/>
-        <p:nvPr/>
-      </p:nvGrpSpPr>
-      <p:grpSpPr>
-        <a:xfrm>
-          <a:off x="0" y="0"/>
-          <a:ext cx="0" cy="0"/>
-          <a:chOff x="0" y="0"/>
-          <a:chExt cx="0" cy="0"/>
-        </a:xfrm>
-      </p:grpSpPr>
-      <p:sp>
-        <p:nvSpPr>
-          <p:cNvPr id="278" name="Google Shape;278;p40"/>
-          <p:cNvSpPr txBox="1">
-            <a:spLocks noGrp="1"/>
-          </p:cNvSpPr>
-          <p:nvPr>
-            <p:ph type="title"/>
-          </p:nvPr>
-        </p:nvSpPr>
-        <p:spPr>
-          <a:xfrm>
-            <a:off x="376518" y="380326"/>
-            <a:ext cx="8417858" cy="672620"/>
-          </a:xfrm>
-          <a:prstGeom prst="rect">
-            <a:avLst/>
-          </a:prstGeom>
-          <a:noFill/>
-          <a:ln>
-            <a:noFill/>
-          </a:ln>
-        </p:spPr>
-        <p:txBody>
-          <a:bodyPr spcFirstLastPara="1" wrap="square" lIns="91425" tIns="45700" rIns="91425" bIns="45700" anchor="t" anchorCtr="0">
-            <a:noAutofit/>
-          </a:bodyPr>
-          <a:lstStyle/>
-          <a:p>
-            <a:pPr marL="0" marR="0" lvl="0" indent="0" rtl="0">
-              <a:lnSpc>
-                <a:spcPct val="90000"/>
-              </a:lnSpc>
-              <a:spcBef>
-                <a:spcPts val="0"/>
-              </a:spcBef>
-              <a:spcAft>
-                <a:spcPts val="0"/>
-              </a:spcAft>
-              <a:buClr>
-                <a:srgbClr val="63666A"/>
-              </a:buClr>
-              <a:buSzPts val="2400"/>
-              <a:buFont typeface="Calibri"/>
-              <a:buNone/>
-            </a:pPr>
-            <a:r>
-              <a:rPr lang="en-GB" b="1" dirty="0">
-                <a:latin typeface="Arial Rounded MT Bold" panose="020F0704030504030204" pitchFamily="34" charset="0"/>
-              </a:rPr>
-              <a:t>LSF queues on </a:t>
-            </a:r>
-            <a:r>
-              <a:rPr lang="en-GB" b="1" dirty="0" smtClean="0">
-                <a:latin typeface="Arial Rounded MT Bold" panose="020F0704030504030204" pitchFamily="34" charset="0"/>
-              </a:rPr>
-              <a:t>LOTUS </a:t>
-            </a:r>
-            <a:endParaRPr b="1" i="0" u="none" strike="noStrike" cap="none" dirty="0">
-              <a:solidFill>
-                <a:srgbClr val="63666A"/>
-              </a:solidFill>
-              <a:latin typeface="Arial Rounded MT Bold" panose="020F0704030504030204" pitchFamily="34" charset="0"/>
-              <a:sym typeface="Calibri"/>
-            </a:endParaRPr>
-          </a:p>
-        </p:txBody>
-      </p:sp>
-      <p:sp>
-        <p:nvSpPr>
-          <p:cNvPr id="279" name="Google Shape;279;p40"/>
-          <p:cNvSpPr txBox="1">
-            <a:spLocks noGrp="1"/>
-          </p:cNvSpPr>
-          <p:nvPr>
-            <p:ph type="body" idx="1"/>
-          </p:nvPr>
-        </p:nvSpPr>
-        <p:spPr>
-          <a:prstGeom prst="rect">
-            <a:avLst/>
-          </a:prstGeom>
-          <a:noFill/>
-          <a:ln>
-            <a:noFill/>
-          </a:ln>
-        </p:spPr>
-        <p:txBody>
-          <a:bodyPr spcFirstLastPara="1" wrap="square" lIns="91425" tIns="45700" rIns="91425" bIns="45700" anchor="t" anchorCtr="0">
-            <a:noAutofit/>
-          </a:bodyPr>
-          <a:lstStyle/>
-          <a:p>
-            <a:pPr marL="0" lvl="0" indent="0" algn="l" rtl="0">
-              <a:spcBef>
-                <a:spcPts val="0"/>
-              </a:spcBef>
-              <a:spcAft>
-                <a:spcPts val="0"/>
-              </a:spcAft>
-              <a:buClr>
-                <a:srgbClr val="63666A"/>
-              </a:buClr>
-              <a:buSzPts val="2800"/>
-              <a:buFont typeface="Arial"/>
-              <a:buNone/>
-            </a:pPr>
-            <a:r>
-              <a:rPr lang="en-GB" sz="2800" dirty="0"/>
-              <a:t>Serial queues -single core</a:t>
-            </a:r>
-            <a:endParaRPr sz="2800" dirty="0"/>
-          </a:p>
-          <a:p>
-            <a:pPr marL="457200" lvl="0" indent="-381000" algn="l" rtl="0">
-              <a:lnSpc>
-                <a:spcPct val="115000"/>
-              </a:lnSpc>
-              <a:spcBef>
-                <a:spcPts val="500"/>
-              </a:spcBef>
-              <a:spcAft>
-                <a:spcPts val="0"/>
-              </a:spcAft>
-              <a:buClr>
-                <a:srgbClr val="032044"/>
-              </a:buClr>
-              <a:buSzPts val="2400"/>
-              <a:buChar char="●"/>
-            </a:pPr>
-            <a:r>
-              <a:rPr lang="en-GB" sz="2400" dirty="0">
-                <a:solidFill>
-                  <a:srgbClr val="032044"/>
-                </a:solidFill>
-                <a:latin typeface="Courier"/>
-                <a:ea typeface="Courier"/>
-                <a:cs typeface="Courier"/>
-                <a:sym typeface="Courier"/>
-              </a:rPr>
-              <a:t>short-serial</a:t>
-            </a:r>
-            <a:r>
-              <a:rPr lang="en-GB" sz="2400" dirty="0">
-                <a:solidFill>
-                  <a:srgbClr val="032044"/>
-                </a:solidFill>
-              </a:rPr>
-              <a:t> : default queue, runtime limit 24 hrs, memory control limit </a:t>
-            </a:r>
-            <a:endParaRPr sz="2400" dirty="0">
-              <a:solidFill>
-                <a:srgbClr val="032044"/>
-              </a:solidFill>
-            </a:endParaRPr>
-          </a:p>
-          <a:p>
-            <a:pPr marL="457200" lvl="0" indent="-381000" algn="l" rtl="0">
-              <a:lnSpc>
-                <a:spcPct val="115000"/>
-              </a:lnSpc>
-              <a:spcBef>
-                <a:spcPts val="0"/>
-              </a:spcBef>
-              <a:spcAft>
-                <a:spcPts val="0"/>
-              </a:spcAft>
-              <a:buClr>
-                <a:srgbClr val="032044"/>
-              </a:buClr>
-              <a:buSzPts val="2400"/>
-              <a:buChar char="●"/>
-            </a:pPr>
-            <a:r>
-              <a:rPr lang="en-GB" sz="2400" dirty="0">
-                <a:solidFill>
-                  <a:srgbClr val="032044"/>
-                </a:solidFill>
-                <a:latin typeface="Courier"/>
-                <a:ea typeface="Courier"/>
-                <a:cs typeface="Courier"/>
-                <a:sym typeface="Courier"/>
-              </a:rPr>
-              <a:t>long-serial</a:t>
-            </a:r>
-            <a:r>
-              <a:rPr lang="en-GB" sz="2400" dirty="0">
-                <a:solidFill>
-                  <a:srgbClr val="032044"/>
-                </a:solidFill>
-              </a:rPr>
-              <a:t> : runtime limit 168 hrs, memory control </a:t>
-            </a:r>
-            <a:r>
-              <a:rPr lang="en-GB" sz="2400" dirty="0" smtClean="0">
-                <a:solidFill>
-                  <a:srgbClr val="032044"/>
-                </a:solidFill>
-              </a:rPr>
-              <a:t>limit</a:t>
-            </a:r>
-            <a:endParaRPr lang="en-GB" dirty="0">
-              <a:solidFill>
-                <a:srgbClr val="032044"/>
-              </a:solidFill>
-            </a:endParaRPr>
-          </a:p>
-          <a:p>
-            <a:pPr marL="457200" lvl="0" indent="-381000" algn="l" rtl="0">
-              <a:lnSpc>
-                <a:spcPct val="115000"/>
-              </a:lnSpc>
-              <a:spcBef>
-                <a:spcPts val="0"/>
-              </a:spcBef>
-              <a:spcAft>
-                <a:spcPts val="0"/>
-              </a:spcAft>
-              <a:buClr>
-                <a:srgbClr val="032044"/>
-              </a:buClr>
-              <a:buSzPts val="2400"/>
-              <a:buChar char="●"/>
-            </a:pPr>
-            <a:endParaRPr sz="1200" dirty="0">
-              <a:solidFill>
-                <a:srgbClr val="032044"/>
-              </a:solidFill>
-            </a:endParaRPr>
-          </a:p>
-          <a:p>
-            <a:pPr marL="0" lvl="0" indent="0" algn="l" rtl="0">
-              <a:spcBef>
-                <a:spcPts val="0"/>
-              </a:spcBef>
-              <a:spcAft>
-                <a:spcPts val="0"/>
-              </a:spcAft>
-              <a:buClr>
-                <a:srgbClr val="63666A"/>
-              </a:buClr>
-              <a:buSzPts val="2800"/>
-              <a:buFont typeface="Arial"/>
-              <a:buNone/>
-            </a:pPr>
-            <a:r>
-              <a:rPr lang="en-GB" sz="2800" dirty="0"/>
-              <a:t>Parallel queues -multiple cores, runtime limit 48 hrs</a:t>
-            </a:r>
-            <a:endParaRPr sz="2800" dirty="0"/>
-          </a:p>
-          <a:p>
-            <a:pPr marL="457200" lvl="0" indent="-381000" algn="l" rtl="0">
-              <a:lnSpc>
-                <a:spcPct val="115000"/>
-              </a:lnSpc>
-              <a:spcBef>
-                <a:spcPts val="500"/>
-              </a:spcBef>
-              <a:spcAft>
-                <a:spcPts val="0"/>
-              </a:spcAft>
-              <a:buClr>
-                <a:srgbClr val="032044"/>
-              </a:buClr>
-              <a:buSzPts val="2400"/>
-              <a:buChar char="●"/>
-            </a:pPr>
-            <a:r>
-              <a:rPr lang="en-GB" sz="2400" dirty="0">
-                <a:solidFill>
-                  <a:srgbClr val="032044"/>
-                </a:solidFill>
-                <a:latin typeface="Courier"/>
-                <a:ea typeface="Courier"/>
-                <a:cs typeface="Courier"/>
-                <a:sym typeface="Courier"/>
-              </a:rPr>
-              <a:t>par-single</a:t>
-            </a:r>
-            <a:r>
-              <a:rPr lang="en-GB" sz="2400" dirty="0">
-                <a:solidFill>
-                  <a:srgbClr val="032044"/>
-                </a:solidFill>
-              </a:rPr>
-              <a:t> : 16 cores limit on a single compute node</a:t>
-            </a:r>
-            <a:endParaRPr sz="2400" dirty="0">
-              <a:solidFill>
-                <a:srgbClr val="032044"/>
-              </a:solidFill>
-            </a:endParaRPr>
-          </a:p>
-          <a:p>
-            <a:pPr marL="457200" lvl="0" indent="-381000" algn="l" rtl="0">
-              <a:lnSpc>
-                <a:spcPct val="115000"/>
-              </a:lnSpc>
-              <a:spcBef>
-                <a:spcPts val="0"/>
-              </a:spcBef>
-              <a:spcAft>
-                <a:spcPts val="0"/>
-              </a:spcAft>
-              <a:buClr>
-                <a:srgbClr val="032044"/>
-              </a:buClr>
-              <a:buSzPts val="2400"/>
-              <a:buChar char="●"/>
-            </a:pPr>
-            <a:r>
-              <a:rPr lang="en-GB" sz="2400" dirty="0">
-                <a:solidFill>
-                  <a:srgbClr val="032044"/>
-                </a:solidFill>
-                <a:latin typeface="Courier"/>
-                <a:ea typeface="Courier"/>
-                <a:cs typeface="Courier"/>
-                <a:sym typeface="Courier"/>
-              </a:rPr>
-              <a:t>par-multi</a:t>
-            </a:r>
-            <a:r>
-              <a:rPr lang="en-GB" sz="2400" dirty="0">
-                <a:solidFill>
-                  <a:srgbClr val="032044"/>
-                </a:solidFill>
-              </a:rPr>
-              <a:t> : cores distributed across many compute </a:t>
-            </a:r>
-            <a:r>
-              <a:rPr lang="en-GB" sz="2400" dirty="0" smtClean="0">
-                <a:solidFill>
-                  <a:srgbClr val="032044"/>
-                </a:solidFill>
-              </a:rPr>
-              <a:t>nodes</a:t>
-            </a:r>
-            <a:endParaRPr sz="2400" dirty="0">
-              <a:solidFill>
-                <a:srgbClr val="032044"/>
-              </a:solidFill>
-            </a:endParaRPr>
-          </a:p>
-          <a:p>
-            <a:pPr marL="0" lvl="0" indent="0" algn="l" rtl="0">
-              <a:lnSpc>
-                <a:spcPct val="115000"/>
-              </a:lnSpc>
-              <a:spcBef>
-                <a:spcPts val="500"/>
-              </a:spcBef>
-              <a:spcAft>
-                <a:spcPts val="0"/>
-              </a:spcAft>
-              <a:buNone/>
-            </a:pPr>
-            <a:r>
-              <a:rPr lang="en-GB" sz="2800" dirty="0"/>
-              <a:t>High memory - single core</a:t>
-            </a:r>
-            <a:endParaRPr sz="2800" dirty="0">
-              <a:solidFill>
-                <a:srgbClr val="032044"/>
-              </a:solidFill>
-            </a:endParaRPr>
-          </a:p>
-          <a:p>
-            <a:pPr marL="457200" lvl="0" indent="-381000" algn="l" rtl="0">
-              <a:lnSpc>
-                <a:spcPct val="115000"/>
-              </a:lnSpc>
-              <a:spcBef>
-                <a:spcPts val="500"/>
-              </a:spcBef>
-              <a:spcAft>
-                <a:spcPts val="0"/>
-              </a:spcAft>
-              <a:buClr>
-                <a:srgbClr val="032044"/>
-              </a:buClr>
-              <a:buSzPts val="2400"/>
-              <a:buChar char="●"/>
-            </a:pPr>
-            <a:r>
-              <a:rPr lang="en-GB" sz="2400" dirty="0">
-                <a:solidFill>
-                  <a:srgbClr val="032044"/>
-                </a:solidFill>
-                <a:latin typeface="Courier"/>
-              </a:rPr>
-              <a:t>high-mem </a:t>
-            </a:r>
-            <a:endParaRPr sz="2400" dirty="0">
-              <a:solidFill>
-                <a:srgbClr val="032044"/>
-              </a:solidFill>
-              <a:latin typeface="Courier"/>
-            </a:endParaRPr>
-          </a:p>
-          <a:p>
-            <a:pPr marL="457200" lvl="0" indent="0" algn="l" rtl="0">
-              <a:lnSpc>
-                <a:spcPct val="115000"/>
-              </a:lnSpc>
-              <a:spcBef>
-                <a:spcPts val="500"/>
-              </a:spcBef>
-              <a:spcAft>
-                <a:spcPts val="0"/>
-              </a:spcAft>
-              <a:buNone/>
-            </a:pPr>
-            <a:endParaRPr sz="2400" dirty="0"/>
-          </a:p>
-        </p:txBody>
-      </p:sp>
     </p:spTree>
   </p:cSld>
   <p:clrMapOvr>
@@ -18092,6 +18029,456 @@
   <p:cSld>
     <p:spTree>
       <p:nvGrpSpPr>
+        <p:cNvPr id="1" name="Shape 277"/>
+        <p:cNvGrpSpPr/>
+        <p:nvPr/>
+      </p:nvGrpSpPr>
+      <p:grpSpPr>
+        <a:xfrm>
+          <a:off x="0" y="0"/>
+          <a:ext cx="0" cy="0"/>
+          <a:chOff x="0" y="0"/>
+          <a:chExt cx="0" cy="0"/>
+        </a:xfrm>
+      </p:grpSpPr>
+      <p:sp>
+        <p:nvSpPr>
+          <p:cNvPr id="278" name="Google Shape;278;p40"/>
+          <p:cNvSpPr txBox="1">
+            <a:spLocks noGrp="1"/>
+          </p:cNvSpPr>
+          <p:nvPr>
+            <p:ph type="title"/>
+          </p:nvPr>
+        </p:nvSpPr>
+        <p:spPr>
+          <a:xfrm>
+            <a:off x="376518" y="380326"/>
+            <a:ext cx="8417858" cy="672620"/>
+          </a:xfrm>
+          <a:prstGeom prst="rect">
+            <a:avLst/>
+          </a:prstGeom>
+          <a:noFill/>
+          <a:ln>
+            <a:noFill/>
+          </a:ln>
+        </p:spPr>
+        <p:txBody>
+          <a:bodyPr spcFirstLastPara="1" wrap="square" lIns="91425" tIns="45700" rIns="91425" bIns="45700" anchor="t" anchorCtr="0">
+            <a:noAutofit/>
+          </a:bodyPr>
+          <a:lstStyle/>
+          <a:p>
+            <a:pPr marL="0" marR="0" lvl="0" indent="0" rtl="0">
+              <a:lnSpc>
+                <a:spcPct val="90000"/>
+              </a:lnSpc>
+              <a:spcBef>
+                <a:spcPts val="0"/>
+              </a:spcBef>
+              <a:spcAft>
+                <a:spcPts val="0"/>
+              </a:spcAft>
+              <a:buClr>
+                <a:srgbClr val="63666A"/>
+              </a:buClr>
+              <a:buSzPts val="2400"/>
+              <a:buFont typeface="Calibri"/>
+              <a:buNone/>
+            </a:pPr>
+            <a:r>
+              <a:rPr lang="en-GB" b="1" dirty="0">
+                <a:latin typeface="Arial Rounded MT Bold" panose="020F0704030504030204" pitchFamily="34" charset="0"/>
+              </a:rPr>
+              <a:t>LSF queues on </a:t>
+            </a:r>
+            <a:r>
+              <a:rPr lang="en-GB" b="1" dirty="0" smtClean="0">
+                <a:latin typeface="Arial Rounded MT Bold" panose="020F0704030504030204" pitchFamily="34" charset="0"/>
+              </a:rPr>
+              <a:t>LOTUS </a:t>
+            </a:r>
+            <a:endParaRPr b="1" i="0" u="none" strike="noStrike" cap="none" dirty="0">
+              <a:solidFill>
+                <a:srgbClr val="63666A"/>
+              </a:solidFill>
+              <a:latin typeface="Arial Rounded MT Bold" panose="020F0704030504030204" pitchFamily="34" charset="0"/>
+              <a:sym typeface="Calibri"/>
+            </a:endParaRPr>
+          </a:p>
+        </p:txBody>
+      </p:sp>
+      <p:sp>
+        <p:nvSpPr>
+          <p:cNvPr id="279" name="Google Shape;279;p40"/>
+          <p:cNvSpPr txBox="1">
+            <a:spLocks noGrp="1"/>
+          </p:cNvSpPr>
+          <p:nvPr>
+            <p:ph type="body" idx="1"/>
+          </p:nvPr>
+        </p:nvSpPr>
+        <p:spPr>
+          <a:prstGeom prst="rect">
+            <a:avLst/>
+          </a:prstGeom>
+          <a:noFill/>
+          <a:ln>
+            <a:noFill/>
+          </a:ln>
+        </p:spPr>
+        <p:txBody>
+          <a:bodyPr spcFirstLastPara="1" wrap="square" lIns="91425" tIns="45700" rIns="91425" bIns="45700" anchor="t" anchorCtr="0">
+            <a:noAutofit/>
+          </a:bodyPr>
+          <a:lstStyle/>
+          <a:p>
+            <a:pPr marL="0" lvl="0" indent="0" algn="l" rtl="0">
+              <a:spcBef>
+                <a:spcPts val="0"/>
+              </a:spcBef>
+              <a:spcAft>
+                <a:spcPts val="0"/>
+              </a:spcAft>
+              <a:buClr>
+                <a:srgbClr val="63666A"/>
+              </a:buClr>
+              <a:buSzPts val="2800"/>
+              <a:buFont typeface="Arial"/>
+              <a:buNone/>
+            </a:pPr>
+            <a:r>
+              <a:rPr lang="en-GB" sz="2800" dirty="0"/>
+              <a:t>Serial queues -single core</a:t>
+            </a:r>
+            <a:endParaRPr sz="2800" dirty="0"/>
+          </a:p>
+          <a:p>
+            <a:pPr marL="457200" lvl="0" indent="-381000" algn="l" rtl="0">
+              <a:lnSpc>
+                <a:spcPct val="115000"/>
+              </a:lnSpc>
+              <a:spcBef>
+                <a:spcPts val="500"/>
+              </a:spcBef>
+              <a:spcAft>
+                <a:spcPts val="0"/>
+              </a:spcAft>
+              <a:buClr>
+                <a:srgbClr val="032044"/>
+              </a:buClr>
+              <a:buSzPts val="2400"/>
+              <a:buChar char="●"/>
+            </a:pPr>
+            <a:r>
+              <a:rPr lang="en-GB" sz="2400" dirty="0">
+                <a:solidFill>
+                  <a:srgbClr val="032044"/>
+                </a:solidFill>
+                <a:latin typeface="Courier"/>
+                <a:ea typeface="Courier"/>
+                <a:cs typeface="Courier"/>
+                <a:sym typeface="Courier"/>
+              </a:rPr>
+              <a:t>short-serial</a:t>
+            </a:r>
+            <a:r>
+              <a:rPr lang="en-GB" sz="2400" dirty="0">
+                <a:solidFill>
+                  <a:srgbClr val="032044"/>
+                </a:solidFill>
+              </a:rPr>
+              <a:t> : default queue, runtime limit 24 hrs, memory control limit </a:t>
+            </a:r>
+            <a:endParaRPr sz="2400" dirty="0">
+              <a:solidFill>
+                <a:srgbClr val="032044"/>
+              </a:solidFill>
+            </a:endParaRPr>
+          </a:p>
+          <a:p>
+            <a:pPr marL="457200" lvl="0" indent="-381000" algn="l" rtl="0">
+              <a:lnSpc>
+                <a:spcPct val="115000"/>
+              </a:lnSpc>
+              <a:spcBef>
+                <a:spcPts val="0"/>
+              </a:spcBef>
+              <a:spcAft>
+                <a:spcPts val="0"/>
+              </a:spcAft>
+              <a:buClr>
+                <a:srgbClr val="032044"/>
+              </a:buClr>
+              <a:buSzPts val="2400"/>
+              <a:buChar char="●"/>
+            </a:pPr>
+            <a:r>
+              <a:rPr lang="en-GB" sz="2400" dirty="0">
+                <a:solidFill>
+                  <a:srgbClr val="032044"/>
+                </a:solidFill>
+                <a:latin typeface="Courier"/>
+                <a:ea typeface="Courier"/>
+                <a:cs typeface="Courier"/>
+                <a:sym typeface="Courier"/>
+              </a:rPr>
+              <a:t>long-serial</a:t>
+            </a:r>
+            <a:r>
+              <a:rPr lang="en-GB" sz="2400" dirty="0">
+                <a:solidFill>
+                  <a:srgbClr val="032044"/>
+                </a:solidFill>
+              </a:rPr>
+              <a:t> : runtime limit 168 hrs, memory control </a:t>
+            </a:r>
+            <a:r>
+              <a:rPr lang="en-GB" sz="2400" dirty="0" smtClean="0">
+                <a:solidFill>
+                  <a:srgbClr val="032044"/>
+                </a:solidFill>
+              </a:rPr>
+              <a:t>limit</a:t>
+            </a:r>
+            <a:endParaRPr lang="en-GB" dirty="0">
+              <a:solidFill>
+                <a:srgbClr val="032044"/>
+              </a:solidFill>
+            </a:endParaRPr>
+          </a:p>
+          <a:p>
+            <a:pPr marL="457200" lvl="0" indent="-381000" algn="l" rtl="0">
+              <a:lnSpc>
+                <a:spcPct val="115000"/>
+              </a:lnSpc>
+              <a:spcBef>
+                <a:spcPts val="0"/>
+              </a:spcBef>
+              <a:spcAft>
+                <a:spcPts val="0"/>
+              </a:spcAft>
+              <a:buClr>
+                <a:srgbClr val="032044"/>
+              </a:buClr>
+              <a:buSzPts val="2400"/>
+              <a:buChar char="●"/>
+            </a:pPr>
+            <a:endParaRPr sz="1200" dirty="0">
+              <a:solidFill>
+                <a:srgbClr val="032044"/>
+              </a:solidFill>
+            </a:endParaRPr>
+          </a:p>
+          <a:p>
+            <a:pPr marL="0" lvl="0" indent="0" algn="l" rtl="0">
+              <a:spcBef>
+                <a:spcPts val="0"/>
+              </a:spcBef>
+              <a:spcAft>
+                <a:spcPts val="0"/>
+              </a:spcAft>
+              <a:buClr>
+                <a:srgbClr val="63666A"/>
+              </a:buClr>
+              <a:buSzPts val="2800"/>
+              <a:buFont typeface="Arial"/>
+              <a:buNone/>
+            </a:pPr>
+            <a:r>
+              <a:rPr lang="en-GB" sz="2800" dirty="0"/>
+              <a:t>Parallel queues -multiple cores, runtime limit 48 hrs</a:t>
+            </a:r>
+            <a:endParaRPr sz="2800" dirty="0"/>
+          </a:p>
+          <a:p>
+            <a:pPr marL="457200" lvl="0" indent="-381000" algn="l" rtl="0">
+              <a:lnSpc>
+                <a:spcPct val="115000"/>
+              </a:lnSpc>
+              <a:spcBef>
+                <a:spcPts val="500"/>
+              </a:spcBef>
+              <a:spcAft>
+                <a:spcPts val="0"/>
+              </a:spcAft>
+              <a:buClr>
+                <a:srgbClr val="032044"/>
+              </a:buClr>
+              <a:buSzPts val="2400"/>
+              <a:buChar char="●"/>
+            </a:pPr>
+            <a:r>
+              <a:rPr lang="en-GB" sz="2400" dirty="0">
+                <a:solidFill>
+                  <a:srgbClr val="032044"/>
+                </a:solidFill>
+                <a:latin typeface="Courier"/>
+                <a:ea typeface="Courier"/>
+                <a:cs typeface="Courier"/>
+                <a:sym typeface="Courier"/>
+              </a:rPr>
+              <a:t>par-single</a:t>
+            </a:r>
+            <a:r>
+              <a:rPr lang="en-GB" sz="2400" dirty="0">
+                <a:solidFill>
+                  <a:srgbClr val="032044"/>
+                </a:solidFill>
+              </a:rPr>
+              <a:t> : 16 cores limit on a single compute node</a:t>
+            </a:r>
+            <a:endParaRPr sz="2400" dirty="0">
+              <a:solidFill>
+                <a:srgbClr val="032044"/>
+              </a:solidFill>
+            </a:endParaRPr>
+          </a:p>
+          <a:p>
+            <a:pPr marL="457200" lvl="0" indent="-381000" algn="l" rtl="0">
+              <a:lnSpc>
+                <a:spcPct val="115000"/>
+              </a:lnSpc>
+              <a:spcBef>
+                <a:spcPts val="0"/>
+              </a:spcBef>
+              <a:spcAft>
+                <a:spcPts val="0"/>
+              </a:spcAft>
+              <a:buClr>
+                <a:srgbClr val="032044"/>
+              </a:buClr>
+              <a:buSzPts val="2400"/>
+              <a:buChar char="●"/>
+            </a:pPr>
+            <a:r>
+              <a:rPr lang="en-GB" sz="2400" dirty="0">
+                <a:solidFill>
+                  <a:srgbClr val="032044"/>
+                </a:solidFill>
+                <a:latin typeface="Courier"/>
+                <a:ea typeface="Courier"/>
+                <a:cs typeface="Courier"/>
+                <a:sym typeface="Courier"/>
+              </a:rPr>
+              <a:t>par-multi</a:t>
+            </a:r>
+            <a:r>
+              <a:rPr lang="en-GB" sz="2400" dirty="0">
+                <a:solidFill>
+                  <a:srgbClr val="032044"/>
+                </a:solidFill>
+              </a:rPr>
+              <a:t> : cores distributed across many compute </a:t>
+            </a:r>
+            <a:r>
+              <a:rPr lang="en-GB" sz="2400" dirty="0" smtClean="0">
+                <a:solidFill>
+                  <a:srgbClr val="032044"/>
+                </a:solidFill>
+              </a:rPr>
+              <a:t>nodes</a:t>
+            </a:r>
+            <a:endParaRPr sz="2400" dirty="0">
+              <a:solidFill>
+                <a:srgbClr val="032044"/>
+              </a:solidFill>
+            </a:endParaRPr>
+          </a:p>
+          <a:p>
+            <a:pPr marL="0" lvl="0" indent="0" algn="l" rtl="0">
+              <a:lnSpc>
+                <a:spcPct val="115000"/>
+              </a:lnSpc>
+              <a:spcBef>
+                <a:spcPts val="500"/>
+              </a:spcBef>
+              <a:spcAft>
+                <a:spcPts val="0"/>
+              </a:spcAft>
+              <a:buNone/>
+            </a:pPr>
+            <a:r>
+              <a:rPr lang="en-GB" sz="2800" dirty="0"/>
+              <a:t>High memory - single core</a:t>
+            </a:r>
+            <a:endParaRPr sz="2800" dirty="0">
+              <a:solidFill>
+                <a:srgbClr val="032044"/>
+              </a:solidFill>
+            </a:endParaRPr>
+          </a:p>
+          <a:p>
+            <a:pPr marL="457200" lvl="0" indent="-381000" algn="l" rtl="0">
+              <a:lnSpc>
+                <a:spcPct val="115000"/>
+              </a:lnSpc>
+              <a:spcBef>
+                <a:spcPts val="500"/>
+              </a:spcBef>
+              <a:spcAft>
+                <a:spcPts val="0"/>
+              </a:spcAft>
+              <a:buClr>
+                <a:srgbClr val="032044"/>
+              </a:buClr>
+              <a:buSzPts val="2400"/>
+              <a:buChar char="●"/>
+            </a:pPr>
+            <a:r>
+              <a:rPr lang="en-GB" sz="2400" dirty="0">
+                <a:solidFill>
+                  <a:srgbClr val="032044"/>
+                </a:solidFill>
+                <a:latin typeface="Courier"/>
+              </a:rPr>
+              <a:t>high-mem </a:t>
+            </a:r>
+            <a:endParaRPr sz="2400" dirty="0">
+              <a:solidFill>
+                <a:srgbClr val="032044"/>
+              </a:solidFill>
+              <a:latin typeface="Courier"/>
+            </a:endParaRPr>
+          </a:p>
+          <a:p>
+            <a:pPr marL="457200" lvl="0" indent="0" algn="l" rtl="0">
+              <a:lnSpc>
+                <a:spcPct val="115000"/>
+              </a:lnSpc>
+              <a:spcBef>
+                <a:spcPts val="500"/>
+              </a:spcBef>
+              <a:spcAft>
+                <a:spcPts val="0"/>
+              </a:spcAft>
+              <a:buNone/>
+            </a:pPr>
+            <a:endParaRPr sz="2400" dirty="0"/>
+          </a:p>
+        </p:txBody>
+      </p:sp>
+    </p:spTree>
+  </p:cSld>
+  <p:clrMapOvr>
+    <a:masterClrMapping/>
+  </p:clrMapOvr>
+  <p:timing>
+    <p:tnLst>
+      <p:par>
+        <p:cTn id="1" dur="indefinite" restart="never" nodeType="tmRoot"/>
+      </p:par>
+    </p:tnLst>
+  </p:timing>
+</p:sld>
+</file>
+
+<file path=ppt/slides/slide21.xml><?xml version="1.0" encoding="utf-8"?>
+<p:sld xmlns:a="http://schemas.openxmlformats.org/drawingml/2006/main" xmlns:r="http://schemas.openxmlformats.org/officeDocument/2006/relationships" xmlns:p="http://schemas.openxmlformats.org/presentationml/2006/main">
+  <p:cSld>
+    <p:spTree>
+      <p:nvGrpSpPr>
         <p:cNvPr id="1" name="Shape 308"/>
         <p:cNvGrpSpPr/>
         <p:nvPr/>
@@ -19651,7 +20038,7 @@
 </p:sld>
 </file>
 
-<file path=ppt/slides/slide21.xml><?xml version="1.0" encoding="utf-8"?>
+<file path=ppt/slides/slide22.xml><?xml version="1.0" encoding="utf-8"?>
 <p:sld xmlns:a="http://schemas.openxmlformats.org/drawingml/2006/main" xmlns:r="http://schemas.openxmlformats.org/officeDocument/2006/relationships" xmlns:p="http://schemas.openxmlformats.org/presentationml/2006/main">
   <p:cSld>
     <p:spTree>
@@ -20962,7 +21349,7 @@
 </p:sld>
 </file>
 
-<file path=ppt/slides/slide22.xml><?xml version="1.0" encoding="utf-8"?>
+<file path=ppt/slides/slide23.xml><?xml version="1.0" encoding="utf-8"?>
 <p:sld xmlns:a="http://schemas.openxmlformats.org/drawingml/2006/main" xmlns:r="http://schemas.openxmlformats.org/officeDocument/2006/relationships" xmlns:p="http://schemas.openxmlformats.org/presentationml/2006/main">
   <p:cSld>
     <p:spTree>
@@ -21378,7 +21765,7 @@
 </p:sld>
 </file>
 
-<file path=ppt/slides/slide23.xml><?xml version="1.0" encoding="utf-8"?>
+<file path=ppt/slides/slide24.xml><?xml version="1.0" encoding="utf-8"?>
 <p:sld xmlns:a="http://schemas.openxmlformats.org/drawingml/2006/main" xmlns:r="http://schemas.openxmlformats.org/officeDocument/2006/relationships" xmlns:p="http://schemas.openxmlformats.org/presentationml/2006/main">
   <p:cSld>
     <p:spTree>
@@ -22351,7 +22738,7 @@
 </p:sld>
 </file>
 
-<file path=ppt/slides/slide24.xml><?xml version="1.0" encoding="utf-8"?>
+<file path=ppt/slides/slide25.xml><?xml version="1.0" encoding="utf-8"?>
 <p:sld xmlns:a="http://schemas.openxmlformats.org/drawingml/2006/main" xmlns:r="http://schemas.openxmlformats.org/officeDocument/2006/relationships" xmlns:p="http://schemas.openxmlformats.org/presentationml/2006/main">
   <p:cSld>
     <p:spTree>
@@ -22981,7 +23368,7 @@
 </p:sld>
 </file>
 
-<file path=ppt/slides/slide25.xml><?xml version="1.0" encoding="utf-8"?>
+<file path=ppt/slides/slide26.xml><?xml version="1.0" encoding="utf-8"?>
 <p:sld xmlns:a="http://schemas.openxmlformats.org/drawingml/2006/main" xmlns:r="http://schemas.openxmlformats.org/officeDocument/2006/relationships" xmlns:p="http://schemas.openxmlformats.org/presentationml/2006/main">
   <p:cSld>
     <p:spTree>
@@ -23428,7 +23815,7 @@
 </p:sld>
 </file>
 
-<file path=ppt/slides/slide26.xml><?xml version="1.0" encoding="utf-8"?>
+<file path=ppt/slides/slide27.xml><?xml version="1.0" encoding="utf-8"?>
 <p:sld xmlns:a="http://schemas.openxmlformats.org/drawingml/2006/main" xmlns:r="http://schemas.openxmlformats.org/officeDocument/2006/relationships" xmlns:p="http://schemas.openxmlformats.org/presentationml/2006/main">
   <p:cSld>
     <p:spTree>
@@ -24504,7 +24891,7 @@
 </p:sld>
 </file>
 
-<file path=ppt/slides/slide27.xml><?xml version="1.0" encoding="utf-8"?>
+<file path=ppt/slides/slide28.xml><?xml version="1.0" encoding="utf-8"?>
 <p:sld xmlns:a="http://schemas.openxmlformats.org/drawingml/2006/main" xmlns:r="http://schemas.openxmlformats.org/officeDocument/2006/relationships" xmlns:p="http://schemas.openxmlformats.org/presentationml/2006/main">
   <p:cSld>
     <p:spTree>
@@ -24821,7 +25208,7 @@
 </p:sld>
 </file>
 
-<file path=ppt/slides/slide28.xml><?xml version="1.0" encoding="utf-8"?>
+<file path=ppt/slides/slide29.xml><?xml version="1.0" encoding="utf-8"?>
 <p:sld xmlns:a="http://schemas.openxmlformats.org/drawingml/2006/main" xmlns:r="http://schemas.openxmlformats.org/officeDocument/2006/relationships" xmlns:p="http://schemas.openxmlformats.org/presentationml/2006/main">
   <p:cSld>
     <p:spTree>
@@ -25668,7 +26055,367 @@
 </p:sld>
 </file>
 
-<file path=ppt/slides/slide29.xml><?xml version="1.0" encoding="utf-8"?>
+<file path=ppt/slides/slide3.xml><?xml version="1.0" encoding="utf-8"?>
+<p:sld xmlns:a="http://schemas.openxmlformats.org/drawingml/2006/main" xmlns:r="http://schemas.openxmlformats.org/officeDocument/2006/relationships" xmlns:p="http://schemas.openxmlformats.org/presentationml/2006/main">
+  <p:cSld>
+    <p:spTree>
+      <p:nvGrpSpPr>
+        <p:cNvPr id="1" name="Shape 129"/>
+        <p:cNvGrpSpPr/>
+        <p:nvPr/>
+      </p:nvGrpSpPr>
+      <p:grpSpPr>
+        <a:xfrm>
+          <a:off x="0" y="0"/>
+          <a:ext cx="0" cy="0"/>
+          <a:chOff x="0" y="0"/>
+          <a:chExt cx="0" cy="0"/>
+        </a:xfrm>
+      </p:grpSpPr>
+      <p:sp>
+        <p:nvSpPr>
+          <p:cNvPr id="130" name="Google Shape;130;p24"/>
+          <p:cNvSpPr txBox="1">
+            <a:spLocks noGrp="1"/>
+          </p:cNvSpPr>
+          <p:nvPr>
+            <p:ph type="title"/>
+          </p:nvPr>
+        </p:nvSpPr>
+        <p:spPr>
+          <a:xfrm>
+            <a:off x="457200" y="274638"/>
+            <a:ext cx="8229600" cy="562074"/>
+          </a:xfrm>
+          <a:prstGeom prst="rect">
+            <a:avLst/>
+          </a:prstGeom>
+          <a:noFill/>
+          <a:ln>
+            <a:noFill/>
+          </a:ln>
+        </p:spPr>
+        <p:txBody>
+          <a:bodyPr spcFirstLastPara="1" wrap="square" lIns="91425" tIns="45700" rIns="91425" bIns="45700" anchor="ctr" anchorCtr="0">
+            <a:noAutofit/>
+          </a:bodyPr>
+          <a:lstStyle/>
+          <a:p>
+            <a:pPr marL="0" lvl="0" indent="0" algn="ctr" rtl="0">
+              <a:lnSpc>
+                <a:spcPct val="90000"/>
+              </a:lnSpc>
+              <a:spcBef>
+                <a:spcPts val="0"/>
+              </a:spcBef>
+              <a:spcAft>
+                <a:spcPts val="0"/>
+              </a:spcAft>
+              <a:buClr>
+                <a:schemeClr val="dk1"/>
+              </a:buClr>
+              <a:buSzPts val="3200"/>
+              <a:buFont typeface="Nunito"/>
+              <a:buNone/>
+            </a:pPr>
+            <a:r>
+              <a:rPr lang="en-GB" sz="3200" b="1" dirty="0">
+                <a:latin typeface="Arial Rounded MT Bold" panose="020F0704030504030204" pitchFamily="34" charset="0"/>
+                <a:ea typeface="Nunito"/>
+                <a:cs typeface="Nunito"/>
+                <a:sym typeface="Nunito"/>
+              </a:rPr>
+              <a:t>Processing big data: the issues</a:t>
+            </a:r>
+            <a:endParaRPr dirty="0">
+              <a:latin typeface="Arial Rounded MT Bold" panose="020F0704030504030204" pitchFamily="34" charset="0"/>
+            </a:endParaRPr>
+          </a:p>
+        </p:txBody>
+      </p:sp>
+      <p:sp>
+        <p:nvSpPr>
+          <p:cNvPr id="131" name="Google Shape;131;p24"/>
+          <p:cNvSpPr txBox="1">
+            <a:spLocks noGrp="1"/>
+          </p:cNvSpPr>
+          <p:nvPr>
+            <p:ph type="body" idx="1"/>
+          </p:nvPr>
+        </p:nvSpPr>
+        <p:spPr>
+          <a:xfrm>
+            <a:off x="457200" y="980728"/>
+            <a:ext cx="8229600" cy="4824536"/>
+          </a:xfrm>
+          <a:prstGeom prst="rect">
+            <a:avLst/>
+          </a:prstGeom>
+          <a:noFill/>
+          <a:ln>
+            <a:noFill/>
+          </a:ln>
+        </p:spPr>
+        <p:txBody>
+          <a:bodyPr spcFirstLastPara="1" wrap="square" lIns="91425" tIns="45700" rIns="91425" bIns="45700" anchor="t" anchorCtr="0">
+            <a:noAutofit/>
+          </a:bodyPr>
+          <a:lstStyle/>
+          <a:p>
+            <a:pPr marL="228600" lvl="0" indent="-228600" algn="l" rtl="0">
+              <a:lnSpc>
+                <a:spcPct val="80000"/>
+              </a:lnSpc>
+              <a:spcBef>
+                <a:spcPts val="0"/>
+              </a:spcBef>
+              <a:spcAft>
+                <a:spcPts val="0"/>
+              </a:spcAft>
+              <a:buClr>
+                <a:srgbClr val="000000"/>
+              </a:buClr>
+              <a:buSzPts val="2800"/>
+              <a:buChar char="•"/>
+            </a:pPr>
+            <a:r>
+              <a:rPr lang="en-GB" sz="2800" dirty="0">
+                <a:solidFill>
+                  <a:srgbClr val="000000"/>
+                </a:solidFill>
+              </a:rPr>
+              <a:t>Parallel processing in the Environmental Sciences has historically focussed on running highly-parallelised models.</a:t>
+            </a:r>
+            <a:endParaRPr dirty="0"/>
+          </a:p>
+          <a:p>
+            <a:pPr marL="228600" lvl="0" indent="-228600" algn="l" rtl="0">
+              <a:lnSpc>
+                <a:spcPct val="80000"/>
+              </a:lnSpc>
+              <a:spcBef>
+                <a:spcPts val="1000"/>
+              </a:spcBef>
+              <a:spcAft>
+                <a:spcPts val="0"/>
+              </a:spcAft>
+              <a:buClr>
+                <a:srgbClr val="000000"/>
+              </a:buClr>
+              <a:buSzPts val="2800"/>
+              <a:buChar char="•"/>
+            </a:pPr>
+            <a:r>
+              <a:rPr lang="en-GB" sz="2800" dirty="0">
+                <a:solidFill>
+                  <a:srgbClr val="000000"/>
+                </a:solidFill>
+              </a:rPr>
+              <a:t>Data analysis was typically run sequentially because:</a:t>
+            </a:r>
+            <a:endParaRPr dirty="0"/>
+          </a:p>
+          <a:p>
+            <a:pPr marL="800100" lvl="1" algn="l" rtl="0">
+              <a:lnSpc>
+                <a:spcPct val="80000"/>
+              </a:lnSpc>
+              <a:spcBef>
+                <a:spcPts val="500"/>
+              </a:spcBef>
+              <a:spcAft>
+                <a:spcPts val="0"/>
+              </a:spcAft>
+              <a:buClr>
+                <a:srgbClr val="000000"/>
+              </a:buClr>
+              <a:buSzPts val="2400"/>
+              <a:buFont typeface="Calibri" panose="020F0502020204030204" pitchFamily="34" charset="0"/>
+              <a:buChar char="̶"/>
+            </a:pPr>
+            <a:r>
+              <a:rPr lang="en-GB" sz="2400" dirty="0">
+                <a:solidFill>
+                  <a:srgbClr val="000000"/>
+                </a:solidFill>
+              </a:rPr>
+              <a:t>It was a smaller problem</a:t>
+            </a:r>
+            <a:endParaRPr dirty="0"/>
+          </a:p>
+          <a:p>
+            <a:pPr marL="800100" lvl="1" algn="l" rtl="0">
+              <a:lnSpc>
+                <a:spcPct val="80000"/>
+              </a:lnSpc>
+              <a:spcBef>
+                <a:spcPts val="500"/>
+              </a:spcBef>
+              <a:spcAft>
+                <a:spcPts val="0"/>
+              </a:spcAft>
+              <a:buClr>
+                <a:srgbClr val="000000"/>
+              </a:buClr>
+              <a:buSzPts val="2400"/>
+              <a:buFont typeface="Calibri" panose="020F0502020204030204" pitchFamily="34" charset="0"/>
+              <a:buChar char="̶"/>
+            </a:pPr>
+            <a:r>
+              <a:rPr lang="en-GB" sz="2400" dirty="0">
+                <a:solidFill>
+                  <a:srgbClr val="000000"/>
+                </a:solidFill>
+              </a:rPr>
+              <a:t>It didn’t have parallel resources available</a:t>
+            </a:r>
+            <a:endParaRPr dirty="0"/>
+          </a:p>
+          <a:p>
+            <a:pPr marL="800100" lvl="1" algn="l" rtl="0">
+              <a:lnSpc>
+                <a:spcPct val="80000"/>
+              </a:lnSpc>
+              <a:spcBef>
+                <a:spcPts val="500"/>
+              </a:spcBef>
+              <a:spcAft>
+                <a:spcPts val="0"/>
+              </a:spcAft>
+              <a:buClr>
+                <a:srgbClr val="000000"/>
+              </a:buClr>
+              <a:buSzPts val="2400"/>
+              <a:buFont typeface="Calibri" panose="020F0502020204030204" pitchFamily="34" charset="0"/>
+              <a:buChar char="̶"/>
+            </a:pPr>
+            <a:r>
+              <a:rPr lang="en-GB" sz="2400" dirty="0">
+                <a:solidFill>
+                  <a:srgbClr val="000000"/>
+                </a:solidFill>
+              </a:rPr>
+              <a:t>The software/scientists were not equipped to work in parallel</a:t>
+            </a:r>
+            <a:endParaRPr dirty="0"/>
+          </a:p>
+          <a:p>
+            <a:pPr marL="228600" lvl="0" indent="-228600" algn="l" rtl="0">
+              <a:lnSpc>
+                <a:spcPct val="80000"/>
+              </a:lnSpc>
+              <a:spcBef>
+                <a:spcPts val="1000"/>
+              </a:spcBef>
+              <a:spcAft>
+                <a:spcPts val="0"/>
+              </a:spcAft>
+              <a:buClr>
+                <a:srgbClr val="000000"/>
+              </a:buClr>
+              <a:buSzPts val="2800"/>
+              <a:buChar char="•"/>
+            </a:pPr>
+            <a:r>
+              <a:rPr lang="en-GB" sz="2800" dirty="0">
+                <a:solidFill>
+                  <a:srgbClr val="000000"/>
+                </a:solidFill>
+              </a:rPr>
+              <a:t>The generation of enormous datasets (e.g. UPSCALE – around 300Tb) means that:</a:t>
+            </a:r>
+            <a:endParaRPr dirty="0"/>
+          </a:p>
+          <a:p>
+            <a:pPr marL="800100" lvl="1" algn="l" rtl="0">
+              <a:lnSpc>
+                <a:spcPct val="80000"/>
+              </a:lnSpc>
+              <a:spcBef>
+                <a:spcPts val="500"/>
+              </a:spcBef>
+              <a:spcAft>
+                <a:spcPts val="0"/>
+              </a:spcAft>
+              <a:buClr>
+                <a:srgbClr val="000000"/>
+              </a:buClr>
+              <a:buSzPts val="2400"/>
+              <a:buFont typeface="Calibri" panose="020F0502020204030204" pitchFamily="34" charset="0"/>
+              <a:buChar char="̶"/>
+            </a:pPr>
+            <a:r>
+              <a:rPr lang="en-GB" sz="2400" dirty="0">
+                <a:solidFill>
+                  <a:srgbClr val="000000"/>
+                </a:solidFill>
+              </a:rPr>
+              <a:t>Processing big data </a:t>
+            </a:r>
+            <a:r>
+              <a:rPr lang="en-GB" sz="2400" b="1" dirty="0">
+                <a:solidFill>
+                  <a:srgbClr val="000000"/>
+                </a:solidFill>
+              </a:rPr>
+              <a:t>requires</a:t>
+            </a:r>
+            <a:r>
+              <a:rPr lang="en-GB" sz="2400" dirty="0">
+                <a:solidFill>
+                  <a:srgbClr val="000000"/>
+                </a:solidFill>
+              </a:rPr>
+              <a:t> a parallel approach</a:t>
+            </a:r>
+            <a:endParaRPr dirty="0"/>
+          </a:p>
+          <a:p>
+            <a:pPr marL="800100" lvl="1" algn="l" rtl="0">
+              <a:lnSpc>
+                <a:spcPct val="80000"/>
+              </a:lnSpc>
+              <a:spcBef>
+                <a:spcPts val="500"/>
+              </a:spcBef>
+              <a:spcAft>
+                <a:spcPts val="0"/>
+              </a:spcAft>
+              <a:buClr>
+                <a:srgbClr val="000000"/>
+              </a:buClr>
+              <a:buSzPts val="2400"/>
+              <a:buFont typeface="Calibri" panose="020F0502020204030204" pitchFamily="34" charset="0"/>
+              <a:buChar char="̶"/>
+            </a:pPr>
+            <a:r>
+              <a:rPr lang="en-GB" sz="2400" dirty="0">
+                <a:solidFill>
+                  <a:srgbClr val="000000"/>
+                </a:solidFill>
+              </a:rPr>
+              <a:t>Fortunately, platforms, tools, and programmers are becoming better equipped</a:t>
+            </a:r>
+            <a:endParaRPr sz="2400" dirty="0"/>
+          </a:p>
+        </p:txBody>
+      </p:sp>
+    </p:spTree>
+  </p:cSld>
+  <p:clrMapOvr>
+    <a:masterClrMapping/>
+  </p:clrMapOvr>
+  <p:timing>
+    <p:tnLst>
+      <p:par>
+        <p:cTn id="1" dur="indefinite" restart="never" nodeType="tmRoot"/>
+      </p:par>
+    </p:tnLst>
+  </p:timing>
+</p:sld>
+</file>
+
+<file path=ppt/slides/slide30.xml><?xml version="1.0" encoding="utf-8"?>
 <p:sld xmlns:a="http://schemas.openxmlformats.org/drawingml/2006/main" xmlns:r="http://schemas.openxmlformats.org/officeDocument/2006/relationships" xmlns:p="http://schemas.openxmlformats.org/presentationml/2006/main">
   <p:cSld>
     <p:spTree>
@@ -26665,367 +27412,7 @@
 </p:sld>
 </file>
 
-<file path=ppt/slides/slide3.xml><?xml version="1.0" encoding="utf-8"?>
-<p:sld xmlns:a="http://schemas.openxmlformats.org/drawingml/2006/main" xmlns:r="http://schemas.openxmlformats.org/officeDocument/2006/relationships" xmlns:p="http://schemas.openxmlformats.org/presentationml/2006/main">
-  <p:cSld>
-    <p:spTree>
-      <p:nvGrpSpPr>
-        <p:cNvPr id="1" name="Shape 129"/>
-        <p:cNvGrpSpPr/>
-        <p:nvPr/>
-      </p:nvGrpSpPr>
-      <p:grpSpPr>
-        <a:xfrm>
-          <a:off x="0" y="0"/>
-          <a:ext cx="0" cy="0"/>
-          <a:chOff x="0" y="0"/>
-          <a:chExt cx="0" cy="0"/>
-        </a:xfrm>
-      </p:grpSpPr>
-      <p:sp>
-        <p:nvSpPr>
-          <p:cNvPr id="130" name="Google Shape;130;p24"/>
-          <p:cNvSpPr txBox="1">
-            <a:spLocks noGrp="1"/>
-          </p:cNvSpPr>
-          <p:nvPr>
-            <p:ph type="title"/>
-          </p:nvPr>
-        </p:nvSpPr>
-        <p:spPr>
-          <a:xfrm>
-            <a:off x="457200" y="274638"/>
-            <a:ext cx="8229600" cy="562074"/>
-          </a:xfrm>
-          <a:prstGeom prst="rect">
-            <a:avLst/>
-          </a:prstGeom>
-          <a:noFill/>
-          <a:ln>
-            <a:noFill/>
-          </a:ln>
-        </p:spPr>
-        <p:txBody>
-          <a:bodyPr spcFirstLastPara="1" wrap="square" lIns="91425" tIns="45700" rIns="91425" bIns="45700" anchor="ctr" anchorCtr="0">
-            <a:noAutofit/>
-          </a:bodyPr>
-          <a:lstStyle/>
-          <a:p>
-            <a:pPr marL="0" lvl="0" indent="0" algn="ctr" rtl="0">
-              <a:lnSpc>
-                <a:spcPct val="90000"/>
-              </a:lnSpc>
-              <a:spcBef>
-                <a:spcPts val="0"/>
-              </a:spcBef>
-              <a:spcAft>
-                <a:spcPts val="0"/>
-              </a:spcAft>
-              <a:buClr>
-                <a:schemeClr val="dk1"/>
-              </a:buClr>
-              <a:buSzPts val="3200"/>
-              <a:buFont typeface="Nunito"/>
-              <a:buNone/>
-            </a:pPr>
-            <a:r>
-              <a:rPr lang="en-GB" sz="3200" b="1" dirty="0">
-                <a:latin typeface="Arial Rounded MT Bold" panose="020F0704030504030204" pitchFamily="34" charset="0"/>
-                <a:ea typeface="Nunito"/>
-                <a:cs typeface="Nunito"/>
-                <a:sym typeface="Nunito"/>
-              </a:rPr>
-              <a:t>Processing big data: the issues</a:t>
-            </a:r>
-            <a:endParaRPr dirty="0">
-              <a:latin typeface="Arial Rounded MT Bold" panose="020F0704030504030204" pitchFamily="34" charset="0"/>
-            </a:endParaRPr>
-          </a:p>
-        </p:txBody>
-      </p:sp>
-      <p:sp>
-        <p:nvSpPr>
-          <p:cNvPr id="131" name="Google Shape;131;p24"/>
-          <p:cNvSpPr txBox="1">
-            <a:spLocks noGrp="1"/>
-          </p:cNvSpPr>
-          <p:nvPr>
-            <p:ph type="body" idx="1"/>
-          </p:nvPr>
-        </p:nvSpPr>
-        <p:spPr>
-          <a:xfrm>
-            <a:off x="457200" y="980728"/>
-            <a:ext cx="8229600" cy="4824536"/>
-          </a:xfrm>
-          <a:prstGeom prst="rect">
-            <a:avLst/>
-          </a:prstGeom>
-          <a:noFill/>
-          <a:ln>
-            <a:noFill/>
-          </a:ln>
-        </p:spPr>
-        <p:txBody>
-          <a:bodyPr spcFirstLastPara="1" wrap="square" lIns="91425" tIns="45700" rIns="91425" bIns="45700" anchor="t" anchorCtr="0">
-            <a:noAutofit/>
-          </a:bodyPr>
-          <a:lstStyle/>
-          <a:p>
-            <a:pPr marL="228600" lvl="0" indent="-228600" algn="l" rtl="0">
-              <a:lnSpc>
-                <a:spcPct val="80000"/>
-              </a:lnSpc>
-              <a:spcBef>
-                <a:spcPts val="0"/>
-              </a:spcBef>
-              <a:spcAft>
-                <a:spcPts val="0"/>
-              </a:spcAft>
-              <a:buClr>
-                <a:srgbClr val="000000"/>
-              </a:buClr>
-              <a:buSzPts val="2800"/>
-              <a:buChar char="•"/>
-            </a:pPr>
-            <a:r>
-              <a:rPr lang="en-GB" sz="2800" dirty="0">
-                <a:solidFill>
-                  <a:srgbClr val="000000"/>
-                </a:solidFill>
-              </a:rPr>
-              <a:t>Parallel processing in the Environmental Sciences has historically focussed on running highly-parallelised models.</a:t>
-            </a:r>
-            <a:endParaRPr dirty="0"/>
-          </a:p>
-          <a:p>
-            <a:pPr marL="228600" lvl="0" indent="-228600" algn="l" rtl="0">
-              <a:lnSpc>
-                <a:spcPct val="80000"/>
-              </a:lnSpc>
-              <a:spcBef>
-                <a:spcPts val="1000"/>
-              </a:spcBef>
-              <a:spcAft>
-                <a:spcPts val="0"/>
-              </a:spcAft>
-              <a:buClr>
-                <a:srgbClr val="000000"/>
-              </a:buClr>
-              <a:buSzPts val="2800"/>
-              <a:buChar char="•"/>
-            </a:pPr>
-            <a:r>
-              <a:rPr lang="en-GB" sz="2800" dirty="0">
-                <a:solidFill>
-                  <a:srgbClr val="000000"/>
-                </a:solidFill>
-              </a:rPr>
-              <a:t>Data analysis was typically run sequentially because:</a:t>
-            </a:r>
-            <a:endParaRPr dirty="0"/>
-          </a:p>
-          <a:p>
-            <a:pPr marL="800100" lvl="1" algn="l" rtl="0">
-              <a:lnSpc>
-                <a:spcPct val="80000"/>
-              </a:lnSpc>
-              <a:spcBef>
-                <a:spcPts val="500"/>
-              </a:spcBef>
-              <a:spcAft>
-                <a:spcPts val="0"/>
-              </a:spcAft>
-              <a:buClr>
-                <a:srgbClr val="000000"/>
-              </a:buClr>
-              <a:buSzPts val="2400"/>
-              <a:buFont typeface="Calibri" panose="020F0502020204030204" pitchFamily="34" charset="0"/>
-              <a:buChar char="̶"/>
-            </a:pPr>
-            <a:r>
-              <a:rPr lang="en-GB" sz="2400" dirty="0">
-                <a:solidFill>
-                  <a:srgbClr val="000000"/>
-                </a:solidFill>
-              </a:rPr>
-              <a:t>It was a smaller problem</a:t>
-            </a:r>
-            <a:endParaRPr dirty="0"/>
-          </a:p>
-          <a:p>
-            <a:pPr marL="800100" lvl="1" algn="l" rtl="0">
-              <a:lnSpc>
-                <a:spcPct val="80000"/>
-              </a:lnSpc>
-              <a:spcBef>
-                <a:spcPts val="500"/>
-              </a:spcBef>
-              <a:spcAft>
-                <a:spcPts val="0"/>
-              </a:spcAft>
-              <a:buClr>
-                <a:srgbClr val="000000"/>
-              </a:buClr>
-              <a:buSzPts val="2400"/>
-              <a:buFont typeface="Calibri" panose="020F0502020204030204" pitchFamily="34" charset="0"/>
-              <a:buChar char="̶"/>
-            </a:pPr>
-            <a:r>
-              <a:rPr lang="en-GB" sz="2400" dirty="0">
-                <a:solidFill>
-                  <a:srgbClr val="000000"/>
-                </a:solidFill>
-              </a:rPr>
-              <a:t>It didn’t have parallel resources available</a:t>
-            </a:r>
-            <a:endParaRPr dirty="0"/>
-          </a:p>
-          <a:p>
-            <a:pPr marL="800100" lvl="1" algn="l" rtl="0">
-              <a:lnSpc>
-                <a:spcPct val="80000"/>
-              </a:lnSpc>
-              <a:spcBef>
-                <a:spcPts val="500"/>
-              </a:spcBef>
-              <a:spcAft>
-                <a:spcPts val="0"/>
-              </a:spcAft>
-              <a:buClr>
-                <a:srgbClr val="000000"/>
-              </a:buClr>
-              <a:buSzPts val="2400"/>
-              <a:buFont typeface="Calibri" panose="020F0502020204030204" pitchFamily="34" charset="0"/>
-              <a:buChar char="̶"/>
-            </a:pPr>
-            <a:r>
-              <a:rPr lang="en-GB" sz="2400" dirty="0">
-                <a:solidFill>
-                  <a:srgbClr val="000000"/>
-                </a:solidFill>
-              </a:rPr>
-              <a:t>The software/scientists were not equipped to work in parallel</a:t>
-            </a:r>
-            <a:endParaRPr dirty="0"/>
-          </a:p>
-          <a:p>
-            <a:pPr marL="228600" lvl="0" indent="-228600" algn="l" rtl="0">
-              <a:lnSpc>
-                <a:spcPct val="80000"/>
-              </a:lnSpc>
-              <a:spcBef>
-                <a:spcPts val="1000"/>
-              </a:spcBef>
-              <a:spcAft>
-                <a:spcPts val="0"/>
-              </a:spcAft>
-              <a:buClr>
-                <a:srgbClr val="000000"/>
-              </a:buClr>
-              <a:buSzPts val="2800"/>
-              <a:buChar char="•"/>
-            </a:pPr>
-            <a:r>
-              <a:rPr lang="en-GB" sz="2800" dirty="0">
-                <a:solidFill>
-                  <a:srgbClr val="000000"/>
-                </a:solidFill>
-              </a:rPr>
-              <a:t>The generation of enormous datasets (e.g. UPSCALE – around 300Tb) means that:</a:t>
-            </a:r>
-            <a:endParaRPr dirty="0"/>
-          </a:p>
-          <a:p>
-            <a:pPr marL="800100" lvl="1" algn="l" rtl="0">
-              <a:lnSpc>
-                <a:spcPct val="80000"/>
-              </a:lnSpc>
-              <a:spcBef>
-                <a:spcPts val="500"/>
-              </a:spcBef>
-              <a:spcAft>
-                <a:spcPts val="0"/>
-              </a:spcAft>
-              <a:buClr>
-                <a:srgbClr val="000000"/>
-              </a:buClr>
-              <a:buSzPts val="2400"/>
-              <a:buFont typeface="Calibri" panose="020F0502020204030204" pitchFamily="34" charset="0"/>
-              <a:buChar char="̶"/>
-            </a:pPr>
-            <a:r>
-              <a:rPr lang="en-GB" sz="2400" dirty="0">
-                <a:solidFill>
-                  <a:srgbClr val="000000"/>
-                </a:solidFill>
-              </a:rPr>
-              <a:t>Processing big data </a:t>
-            </a:r>
-            <a:r>
-              <a:rPr lang="en-GB" sz="2400" b="1" dirty="0">
-                <a:solidFill>
-                  <a:srgbClr val="000000"/>
-                </a:solidFill>
-              </a:rPr>
-              <a:t>requires</a:t>
-            </a:r>
-            <a:r>
-              <a:rPr lang="en-GB" sz="2400" dirty="0">
-                <a:solidFill>
-                  <a:srgbClr val="000000"/>
-                </a:solidFill>
-              </a:rPr>
-              <a:t> a parallel approach</a:t>
-            </a:r>
-            <a:endParaRPr dirty="0"/>
-          </a:p>
-          <a:p>
-            <a:pPr marL="800100" lvl="1" algn="l" rtl="0">
-              <a:lnSpc>
-                <a:spcPct val="80000"/>
-              </a:lnSpc>
-              <a:spcBef>
-                <a:spcPts val="500"/>
-              </a:spcBef>
-              <a:spcAft>
-                <a:spcPts val="0"/>
-              </a:spcAft>
-              <a:buClr>
-                <a:srgbClr val="000000"/>
-              </a:buClr>
-              <a:buSzPts val="2400"/>
-              <a:buFont typeface="Calibri" panose="020F0502020204030204" pitchFamily="34" charset="0"/>
-              <a:buChar char="̶"/>
-            </a:pPr>
-            <a:r>
-              <a:rPr lang="en-GB" sz="2400" dirty="0">
-                <a:solidFill>
-                  <a:srgbClr val="000000"/>
-                </a:solidFill>
-              </a:rPr>
-              <a:t>Fortunately, platforms, tools, and programmers are becoming better equipped</a:t>
-            </a:r>
-            <a:endParaRPr sz="2400" dirty="0"/>
-          </a:p>
-        </p:txBody>
-      </p:sp>
-    </p:spTree>
-  </p:cSld>
-  <p:clrMapOvr>
-    <a:masterClrMapping/>
-  </p:clrMapOvr>
-  <p:timing>
-    <p:tnLst>
-      <p:par>
-        <p:cTn id="1" dur="indefinite" restart="never" nodeType="tmRoot"/>
-      </p:par>
-    </p:tnLst>
-  </p:timing>
-</p:sld>
-</file>
-
-<file path=ppt/slides/slide30.xml><?xml version="1.0" encoding="utf-8"?>
+<file path=ppt/slides/slide31.xml><?xml version="1.0" encoding="utf-8"?>
 <p:sld xmlns:a="http://schemas.openxmlformats.org/drawingml/2006/main" xmlns:r="http://schemas.openxmlformats.org/officeDocument/2006/relationships" xmlns:p="http://schemas.openxmlformats.org/presentationml/2006/main">
   <p:cSld>
     <p:spTree>
@@ -27623,7 +28010,7 @@
 </p:sld>
 </file>
 
-<file path=ppt/slides/slide31.xml><?xml version="1.0" encoding="utf-8"?>
+<file path=ppt/slides/slide32.xml><?xml version="1.0" encoding="utf-8"?>
 <p:sld xmlns:a="http://schemas.openxmlformats.org/drawingml/2006/main" xmlns:r="http://schemas.openxmlformats.org/officeDocument/2006/relationships" xmlns:p="http://schemas.openxmlformats.org/presentationml/2006/main">
   <p:cSld>
     <p:spTree>
@@ -27903,7 +28290,7 @@
 </p:sld>
 </file>
 
-<file path=ppt/slides/slide32.xml><?xml version="1.0" encoding="utf-8"?>
+<file path=ppt/slides/slide33.xml><?xml version="1.0" encoding="utf-8"?>
 <p:sld xmlns:a="http://schemas.openxmlformats.org/drawingml/2006/main" xmlns:r="http://schemas.openxmlformats.org/officeDocument/2006/relationships" xmlns:p="http://schemas.openxmlformats.org/presentationml/2006/main">
   <p:cSld>
     <p:spTree>

</xml_diff>